<commit_message>
updated with changes per call
</commit_message>
<xml_diff>
--- a/Financial service modernization workshop/mastering-the-ads-deck.pptx
+++ b/Financial service modernization workshop/mastering-the-ads-deck.pptx
@@ -6,7 +6,7 @@
     <p:sldMasterId id="2147483665" r:id="rId5"/>
   </p:sldMasterIdLst>
   <p:notesMasterIdLst>
-    <p:notesMasterId r:id="rId29"/>
+    <p:notesMasterId r:id="rId31"/>
   </p:notesMasterIdLst>
   <p:sldIdLst>
     <p:sldId id="300" r:id="rId6"/>
@@ -18,20 +18,22 @@
     <p:sldId id="328" r:id="rId12"/>
     <p:sldId id="333" r:id="rId13"/>
     <p:sldId id="335" r:id="rId14"/>
-    <p:sldId id="329" r:id="rId15"/>
-    <p:sldId id="330" r:id="rId16"/>
-    <p:sldId id="336" r:id="rId17"/>
-    <p:sldId id="337" r:id="rId18"/>
-    <p:sldId id="338" r:id="rId19"/>
-    <p:sldId id="356" r:id="rId20"/>
-    <p:sldId id="331" r:id="rId21"/>
-    <p:sldId id="339" r:id="rId22"/>
-    <p:sldId id="332" r:id="rId23"/>
-    <p:sldId id="340" r:id="rId24"/>
-    <p:sldId id="341" r:id="rId25"/>
-    <p:sldId id="343" r:id="rId26"/>
-    <p:sldId id="344" r:id="rId27"/>
-    <p:sldId id="345" r:id="rId28"/>
+    <p:sldId id="357" r:id="rId15"/>
+    <p:sldId id="329" r:id="rId16"/>
+    <p:sldId id="330" r:id="rId17"/>
+    <p:sldId id="336" r:id="rId18"/>
+    <p:sldId id="337" r:id="rId19"/>
+    <p:sldId id="338" r:id="rId20"/>
+    <p:sldId id="356" r:id="rId21"/>
+    <p:sldId id="358" r:id="rId22"/>
+    <p:sldId id="331" r:id="rId23"/>
+    <p:sldId id="339" r:id="rId24"/>
+    <p:sldId id="359" r:id="rId25"/>
+    <p:sldId id="340" r:id="rId26"/>
+    <p:sldId id="341" r:id="rId27"/>
+    <p:sldId id="343" r:id="rId28"/>
+    <p:sldId id="344" r:id="rId29"/>
+    <p:sldId id="345" r:id="rId30"/>
   </p:sldIdLst>
   <p:sldSz cx="12192000" cy="6858000"/>
   <p:notesSz cx="6858000" cy="9144000"/>
@@ -144,15 +146,17 @@
             <p14:sldId id="328"/>
             <p14:sldId id="333"/>
             <p14:sldId id="335"/>
+            <p14:sldId id="357"/>
             <p14:sldId id="329"/>
             <p14:sldId id="330"/>
             <p14:sldId id="336"/>
             <p14:sldId id="337"/>
             <p14:sldId id="338"/>
             <p14:sldId id="356"/>
+            <p14:sldId id="358"/>
             <p14:sldId id="331"/>
             <p14:sldId id="339"/>
-            <p14:sldId id="332"/>
+            <p14:sldId id="359"/>
           </p14:sldIdLst>
         </p14:section>
         <p14:section name="Structure &amp; Execute PoC" id="{8D57AF76-163A-44AB-8C7D-1071192B289B}">
@@ -3748,7 +3752,7 @@
           <a:p>
             <a:fld id="{D9EB630B-BF71-A34E-9F10-CD6A3DB979CB}" type="slidenum">
               <a:rPr lang="en-US" smtClean="0"/>
-              <a:t>17</a:t>
+              <a:t>19</a:t>
             </a:fld>
             <a:endParaRPr lang="en-US"/>
           </a:p>
@@ -3893,7 +3897,7 @@
           <a:p>
             <a:fld id="{D9EB630B-BF71-A34E-9F10-CD6A3DB979CB}" type="slidenum">
               <a:rPr lang="en-US" smtClean="0"/>
-              <a:t>20</a:t>
+              <a:t>22</a:t>
             </a:fld>
             <a:endParaRPr lang="en-US"/>
           </a:p>
@@ -3977,7 +3981,7 @@
           <a:p>
             <a:fld id="{D9EB630B-BF71-A34E-9F10-CD6A3DB979CB}" type="slidenum">
               <a:rPr lang="en-US" smtClean="0"/>
-              <a:t>21</a:t>
+              <a:t>23</a:t>
             </a:fld>
             <a:endParaRPr lang="en-US"/>
           </a:p>
@@ -4061,7 +4065,7 @@
           <a:p>
             <a:fld id="{D9EB630B-BF71-A34E-9F10-CD6A3DB979CB}" type="slidenum">
               <a:rPr lang="en-US" smtClean="0"/>
-              <a:t>22</a:t>
+              <a:t>24</a:t>
             </a:fld>
             <a:endParaRPr lang="en-US"/>
           </a:p>
@@ -4145,7 +4149,7 @@
           <a:p>
             <a:fld id="{D9EB630B-BF71-A34E-9F10-CD6A3DB979CB}" type="slidenum">
               <a:rPr lang="en-US" smtClean="0"/>
-              <a:t>23</a:t>
+              <a:t>25</a:t>
             </a:fld>
             <a:endParaRPr lang="en-US"/>
           </a:p>
@@ -4751,7 +4755,7 @@
           <a:p>
             <a:fld id="{0998D5BB-B127-481F-BC0A-2F77C576BB34}" type="slidenum">
               <a:rPr lang="en-US" smtClean="0"/>
-              <a:t>11</a:t>
+              <a:t>12</a:t>
             </a:fld>
             <a:endParaRPr lang="en-US"/>
           </a:p>
@@ -4835,7 +4839,7 @@
           <a:p>
             <a:fld id="{D9EB630B-BF71-A34E-9F10-CD6A3DB979CB}" type="slidenum">
               <a:rPr lang="en-US" smtClean="0"/>
-              <a:t>12</a:t>
+              <a:t>13</a:t>
             </a:fld>
             <a:endParaRPr lang="en-US"/>
           </a:p>
@@ -4919,7 +4923,7 @@
           <a:p>
             <a:fld id="{D9EB630B-BF71-A34E-9F10-CD6A3DB979CB}" type="slidenum">
               <a:rPr lang="en-US" smtClean="0"/>
-              <a:t>13</a:t>
+              <a:t>14</a:t>
             </a:fld>
             <a:endParaRPr lang="en-US"/>
           </a:p>
@@ -5003,7 +5007,7 @@
           <a:p>
             <a:fld id="{D9EB630B-BF71-A34E-9F10-CD6A3DB979CB}" type="slidenum">
               <a:rPr lang="en-US" smtClean="0"/>
-              <a:t>14</a:t>
+              <a:t>15</a:t>
             </a:fld>
             <a:endParaRPr lang="en-US"/>
           </a:p>
@@ -5092,7 +5096,7 @@
                 </a:solidFill>
               </a:rPr>
               <a:pPr/>
-              <a:t>15</a:t>
+              <a:t>16</a:t>
             </a:fld>
             <a:endParaRPr lang="en-US">
               <a:solidFill>
@@ -17232,6 +17236,130 @@
       </p:grpSpPr>
       <p:sp>
         <p:nvSpPr>
+          <p:cNvPr id="4" name="Title 3">
+            <a:extLst>
+              <a:ext uri="{FF2B5EF4-FFF2-40B4-BE49-F238E27FC236}">
+                <a16:creationId xmlns:a16="http://schemas.microsoft.com/office/drawing/2014/main" id="{C7C47A0F-095C-4A97-A973-43312913AD0B}"/>
+              </a:ext>
+            </a:extLst>
+          </p:cNvPr>
+          <p:cNvSpPr>
+            <a:spLocks noGrp="1"/>
+          </p:cNvSpPr>
+          <p:nvPr>
+            <p:ph type="title"/>
+          </p:nvPr>
+        </p:nvSpPr>
+        <p:spPr>
+          <a:xfrm>
+            <a:off x="269240" y="307254"/>
+            <a:ext cx="6406982" cy="6243491"/>
+          </a:xfrm>
+        </p:spPr>
+        <p:txBody>
+          <a:bodyPr anchor="ctr"/>
+          <a:lstStyle/>
+          <a:p>
+            <a:pPr algn="ctr"/>
+            <a:r>
+              <a:rPr lang="en-US" dirty="0"/>
+              <a:t>What are your </a:t>
+            </a:r>
+            <a:br>
+              <a:rPr lang="en-US" dirty="0"/>
+            </a:br>
+            <a:r>
+              <a:rPr lang="en-US" b="1" dirty="0"/>
+              <a:t>best practices</a:t>
+            </a:r>
+            <a:r>
+              <a:rPr lang="en-US" dirty="0"/>
+              <a:t> in preparing for an ADS?</a:t>
+            </a:r>
+          </a:p>
+        </p:txBody>
+      </p:sp>
+      <p:pic>
+        <p:nvPicPr>
+          <p:cNvPr id="6" name="Graphic 5" descr="Teacher">
+            <a:extLst>
+              <a:ext uri="{FF2B5EF4-FFF2-40B4-BE49-F238E27FC236}">
+                <a16:creationId xmlns:a16="http://schemas.microsoft.com/office/drawing/2014/main" id="{F54B2F38-AD06-4DE0-B5F5-72FF3A60C11E}"/>
+              </a:ext>
+            </a:extLst>
+          </p:cNvPr>
+          <p:cNvPicPr>
+            <a:picLocks noChangeAspect="1"/>
+          </p:cNvPicPr>
+          <p:nvPr/>
+        </p:nvPicPr>
+        <p:blipFill>
+          <a:blip r:embed="rId2">
+            <a:extLst>
+              <a:ext uri="{28A0092B-C50C-407E-A947-70E740481C1C}">
+                <a14:useLocalDpi xmlns:a14="http://schemas.microsoft.com/office/drawing/2010/main" val="0"/>
+              </a:ext>
+              <a:ext uri="{96DAC541-7B7A-43D3-8B79-37D633B846F1}">
+                <asvg:svgBlip xmlns:asvg="http://schemas.microsoft.com/office/drawing/2016/SVG/main" r:embed="rId3"/>
+              </a:ext>
+            </a:extLst>
+          </a:blip>
+          <a:stretch>
+            <a:fillRect/>
+          </a:stretch>
+        </p:blipFill>
+        <p:spPr>
+          <a:xfrm>
+            <a:off x="7220394" y="1077817"/>
+            <a:ext cx="4702366" cy="4702366"/>
+          </a:xfrm>
+          <a:prstGeom prst="rect">
+            <a:avLst/>
+          </a:prstGeom>
+          <a:effectLst>
+            <a:outerShdw blurRad="50800" dist="38100" algn="l" rotWithShape="0">
+              <a:prstClr val="black">
+                <a:alpha val="40000"/>
+              </a:prstClr>
+            </a:outerShdw>
+          </a:effectLst>
+        </p:spPr>
+      </p:pic>
+    </p:spTree>
+    <p:extLst>
+      <p:ext uri="{BB962C8B-B14F-4D97-AF65-F5344CB8AC3E}">
+        <p14:creationId xmlns:p14="http://schemas.microsoft.com/office/powerpoint/2010/main" val="2779730302"/>
+      </p:ext>
+    </p:extLst>
+  </p:cSld>
+  <p:clrMapOvr>
+    <a:masterClrMapping/>
+  </p:clrMapOvr>
+  <p:transition>
+    <p:fade/>
+  </p:transition>
+</p:sld>
+</file>
+
+<file path=ppt/slides/slide11.xml><?xml version="1.0" encoding="utf-8"?>
+<p:sld xmlns:a="http://schemas.openxmlformats.org/drawingml/2006/main" xmlns:r="http://schemas.openxmlformats.org/officeDocument/2006/relationships" xmlns:p="http://schemas.openxmlformats.org/presentationml/2006/main">
+  <p:cSld>
+    <p:spTree>
+      <p:nvGrpSpPr>
+        <p:cNvPr id="1" name=""/>
+        <p:cNvGrpSpPr/>
+        <p:nvPr/>
+      </p:nvGrpSpPr>
+      <p:grpSpPr>
+        <a:xfrm>
+          <a:off x="0" y="0"/>
+          <a:ext cx="0" cy="0"/>
+          <a:chOff x="0" y="0"/>
+          <a:chExt cx="0" cy="0"/>
+        </a:xfrm>
+      </p:grpSpPr>
+      <p:sp>
+        <p:nvSpPr>
           <p:cNvPr id="2" name="Text Placeholder 1">
             <a:extLst>
               <a:ext uri="{FF2B5EF4-FFF2-40B4-BE49-F238E27FC236}">
@@ -17313,7 +17441,7 @@
 </p:sld>
 </file>
 
-<file path=ppt/slides/slide11.xml><?xml version="1.0" encoding="utf-8"?>
+<file path=ppt/slides/slide12.xml><?xml version="1.0" encoding="utf-8"?>
 <p:sld xmlns:a="http://schemas.openxmlformats.org/drawingml/2006/main" xmlns:r="http://schemas.openxmlformats.org/officeDocument/2006/relationships" xmlns:p="http://schemas.openxmlformats.org/presentationml/2006/main">
   <p:cSld>
     <p:spTree>
@@ -17490,7 +17618,7 @@
 </p:sld>
 </file>
 
-<file path=ppt/slides/slide12.xml><?xml version="1.0" encoding="utf-8"?>
+<file path=ppt/slides/slide13.xml><?xml version="1.0" encoding="utf-8"?>
 <p:sld xmlns:a="http://schemas.openxmlformats.org/drawingml/2006/main" xmlns:r="http://schemas.openxmlformats.org/officeDocument/2006/relationships" xmlns:p="http://schemas.openxmlformats.org/presentationml/2006/main">
   <p:cSld>
     <p:spTree>
@@ -17812,7 +17940,7 @@
 </p:sld>
 </file>
 
-<file path=ppt/slides/slide13.xml><?xml version="1.0" encoding="utf-8"?>
+<file path=ppt/slides/slide14.xml><?xml version="1.0" encoding="utf-8"?>
 <p:sld xmlns:a="http://schemas.openxmlformats.org/drawingml/2006/main" xmlns:r="http://schemas.openxmlformats.org/officeDocument/2006/relationships" xmlns:p="http://schemas.openxmlformats.org/presentationml/2006/main">
   <p:cSld>
     <p:spTree>
@@ -18144,7 +18272,7 @@
 </p:sld>
 </file>
 
-<file path=ppt/slides/slide14.xml><?xml version="1.0" encoding="utf-8"?>
+<file path=ppt/slides/slide15.xml><?xml version="1.0" encoding="utf-8"?>
 <p:sld xmlns:a="http://schemas.openxmlformats.org/drawingml/2006/main" xmlns:r="http://schemas.openxmlformats.org/officeDocument/2006/relationships" xmlns:p="http://schemas.openxmlformats.org/presentationml/2006/main">
   <p:cSld>
     <p:spTree>
@@ -18514,7 +18642,7 @@
 </p:sld>
 </file>
 
-<file path=ppt/slides/slide15.xml><?xml version="1.0" encoding="utf-8"?>
+<file path=ppt/slides/slide16.xml><?xml version="1.0" encoding="utf-8"?>
 <p:sld xmlns:a="http://schemas.openxmlformats.org/drawingml/2006/main" xmlns:r="http://schemas.openxmlformats.org/officeDocument/2006/relationships" xmlns:p="http://schemas.openxmlformats.org/presentationml/2006/main">
   <p:cSld>
     <p:spTree>
@@ -20067,7 +20195,131 @@
 </p:sld>
 </file>
 
-<file path=ppt/slides/slide16.xml><?xml version="1.0" encoding="utf-8"?>
+<file path=ppt/slides/slide17.xml><?xml version="1.0" encoding="utf-8"?>
+<p:sld xmlns:a="http://schemas.openxmlformats.org/drawingml/2006/main" xmlns:r="http://schemas.openxmlformats.org/officeDocument/2006/relationships" xmlns:p="http://schemas.openxmlformats.org/presentationml/2006/main">
+  <p:cSld>
+    <p:spTree>
+      <p:nvGrpSpPr>
+        <p:cNvPr id="1" name=""/>
+        <p:cNvGrpSpPr/>
+        <p:nvPr/>
+      </p:nvGrpSpPr>
+      <p:grpSpPr>
+        <a:xfrm>
+          <a:off x="0" y="0"/>
+          <a:ext cx="0" cy="0"/>
+          <a:chOff x="0" y="0"/>
+          <a:chExt cx="0" cy="0"/>
+        </a:xfrm>
+      </p:grpSpPr>
+      <p:sp>
+        <p:nvSpPr>
+          <p:cNvPr id="4" name="Title 3">
+            <a:extLst>
+              <a:ext uri="{FF2B5EF4-FFF2-40B4-BE49-F238E27FC236}">
+                <a16:creationId xmlns:a16="http://schemas.microsoft.com/office/drawing/2014/main" id="{C7C47A0F-095C-4A97-A973-43312913AD0B}"/>
+              </a:ext>
+            </a:extLst>
+          </p:cNvPr>
+          <p:cNvSpPr>
+            <a:spLocks noGrp="1"/>
+          </p:cNvSpPr>
+          <p:nvPr>
+            <p:ph type="title"/>
+          </p:nvPr>
+        </p:nvSpPr>
+        <p:spPr>
+          <a:xfrm>
+            <a:off x="269240" y="307254"/>
+            <a:ext cx="6406982" cy="6243491"/>
+          </a:xfrm>
+        </p:spPr>
+        <p:txBody>
+          <a:bodyPr anchor="ctr"/>
+          <a:lstStyle/>
+          <a:p>
+            <a:pPr algn="ctr"/>
+            <a:r>
+              <a:rPr lang="en-US" dirty="0"/>
+              <a:t>What are your </a:t>
+            </a:r>
+            <a:br>
+              <a:rPr lang="en-US" dirty="0"/>
+            </a:br>
+            <a:r>
+              <a:rPr lang="en-US" b="1" dirty="0"/>
+              <a:t>best practices</a:t>
+            </a:r>
+            <a:r>
+              <a:rPr lang="en-US" dirty="0"/>
+              <a:t> for delivering an ADS?</a:t>
+            </a:r>
+          </a:p>
+        </p:txBody>
+      </p:sp>
+      <p:pic>
+        <p:nvPicPr>
+          <p:cNvPr id="6" name="Graphic 5" descr="Teacher">
+            <a:extLst>
+              <a:ext uri="{FF2B5EF4-FFF2-40B4-BE49-F238E27FC236}">
+                <a16:creationId xmlns:a16="http://schemas.microsoft.com/office/drawing/2014/main" id="{F54B2F38-AD06-4DE0-B5F5-72FF3A60C11E}"/>
+              </a:ext>
+            </a:extLst>
+          </p:cNvPr>
+          <p:cNvPicPr>
+            <a:picLocks noChangeAspect="1"/>
+          </p:cNvPicPr>
+          <p:nvPr/>
+        </p:nvPicPr>
+        <p:blipFill>
+          <a:blip r:embed="rId2">
+            <a:extLst>
+              <a:ext uri="{28A0092B-C50C-407E-A947-70E740481C1C}">
+                <a14:useLocalDpi xmlns:a14="http://schemas.microsoft.com/office/drawing/2010/main" val="0"/>
+              </a:ext>
+              <a:ext uri="{96DAC541-7B7A-43D3-8B79-37D633B846F1}">
+                <asvg:svgBlip xmlns:asvg="http://schemas.microsoft.com/office/drawing/2016/SVG/main" r:embed="rId3"/>
+              </a:ext>
+            </a:extLst>
+          </a:blip>
+          <a:stretch>
+            <a:fillRect/>
+          </a:stretch>
+        </p:blipFill>
+        <p:spPr>
+          <a:xfrm>
+            <a:off x="7220394" y="1077817"/>
+            <a:ext cx="4702366" cy="4702366"/>
+          </a:xfrm>
+          <a:prstGeom prst="rect">
+            <a:avLst/>
+          </a:prstGeom>
+          <a:effectLst>
+            <a:outerShdw blurRad="50800" dist="38100" algn="l" rotWithShape="0">
+              <a:prstClr val="black">
+                <a:alpha val="40000"/>
+              </a:prstClr>
+            </a:outerShdw>
+          </a:effectLst>
+        </p:spPr>
+      </p:pic>
+    </p:spTree>
+    <p:extLst>
+      <p:ext uri="{BB962C8B-B14F-4D97-AF65-F5344CB8AC3E}">
+        <p14:creationId xmlns:p14="http://schemas.microsoft.com/office/powerpoint/2010/main" val="81599200"/>
+      </p:ext>
+    </p:extLst>
+  </p:cSld>
+  <p:clrMapOvr>
+    <a:masterClrMapping/>
+  </p:clrMapOvr>
+  <p:transition>
+    <p:fade/>
+  </p:transition>
+</p:sld>
+</file>
+
+<file path=ppt/slides/slide18.xml><?xml version="1.0" encoding="utf-8"?>
 <p:sld xmlns:a="http://schemas.openxmlformats.org/drawingml/2006/main" xmlns:r="http://schemas.openxmlformats.org/officeDocument/2006/relationships" xmlns:p="http://schemas.openxmlformats.org/presentationml/2006/main">
   <p:cSld>
     <p:spTree>
@@ -20203,7 +20455,7 @@
 </p:sld>
 </file>
 
-<file path=ppt/slides/slide17.xml><?xml version="1.0" encoding="utf-8"?>
+<file path=ppt/slides/slide19.xml><?xml version="1.0" encoding="utf-8"?>
 <p:sld xmlns:a="http://schemas.openxmlformats.org/drawingml/2006/main" xmlns:r="http://schemas.openxmlformats.org/officeDocument/2006/relationships" xmlns:p="http://schemas.openxmlformats.org/presentationml/2006/main">
   <p:cSld>
     <p:spTree>
@@ -20465,7 +20717,146 @@
 </p:sld>
 </file>
 
-<file path=ppt/slides/slide18.xml><?xml version="1.0" encoding="utf-8"?>
+<file path=ppt/slides/slide2.xml><?xml version="1.0" encoding="utf-8"?>
+<p:sld xmlns:a="http://schemas.openxmlformats.org/drawingml/2006/main" xmlns:r="http://schemas.openxmlformats.org/officeDocument/2006/relationships" xmlns:p="http://schemas.openxmlformats.org/presentationml/2006/main">
+  <p:cSld>
+    <p:bg>
+      <p:bgPr>
+        <a:solidFill>
+          <a:schemeClr val="bg2"/>
+        </a:solidFill>
+        <a:effectLst/>
+      </p:bgPr>
+    </p:bg>
+    <p:spTree>
+      <p:nvGrpSpPr>
+        <p:cNvPr id="1" name=""/>
+        <p:cNvGrpSpPr/>
+        <p:nvPr/>
+      </p:nvGrpSpPr>
+      <p:grpSpPr>
+        <a:xfrm>
+          <a:off x="0" y="0"/>
+          <a:ext cx="0" cy="0"/>
+          <a:chOff x="0" y="0"/>
+          <a:chExt cx="0" cy="0"/>
+        </a:xfrm>
+      </p:grpSpPr>
+      <p:sp>
+        <p:nvSpPr>
+          <p:cNvPr id="2" name="Title 1"/>
+          <p:cNvSpPr>
+            <a:spLocks noGrp="1"/>
+          </p:cNvSpPr>
+          <p:nvPr>
+            <p:ph type="title"/>
+          </p:nvPr>
+        </p:nvSpPr>
+        <p:spPr/>
+        <p:txBody>
+          <a:bodyPr>
+            <a:normAutofit/>
+          </a:bodyPr>
+          <a:lstStyle/>
+          <a:p>
+            <a:r>
+              <a:rPr lang="en-US" sz="4400" dirty="0">
+                <a:solidFill>
+                  <a:schemeClr val="tx1"/>
+                </a:solidFill>
+                <a:latin typeface="Segoe UI Light" panose="020B0502040204020203" pitchFamily="34" charset="0"/>
+                <a:cs typeface="Segoe UI Light" panose="020B0502040204020203" pitchFamily="34" charset="0"/>
+              </a:rPr>
+              <a:t>Abstract and learning objectives</a:t>
+            </a:r>
+          </a:p>
+        </p:txBody>
+      </p:sp>
+      <p:sp>
+        <p:nvSpPr>
+          <p:cNvPr id="9" name="TextBox 8">
+            <a:extLst>
+              <a:ext uri="{FF2B5EF4-FFF2-40B4-BE49-F238E27FC236}">
+                <a16:creationId xmlns:a16="http://schemas.microsoft.com/office/drawing/2014/main" id="{0F86F9F9-39B5-4CE6-AF48-9ADAE40EA728}"/>
+              </a:ext>
+            </a:extLst>
+          </p:cNvPr>
+          <p:cNvSpPr txBox="1"/>
+          <p:nvPr/>
+        </p:nvSpPr>
+        <p:spPr>
+          <a:xfrm>
+            <a:off x="340285" y="1741246"/>
+            <a:ext cx="7247965" cy="1868204"/>
+          </a:xfrm>
+          <a:prstGeom prst="rect">
+            <a:avLst/>
+          </a:prstGeom>
+          <a:noFill/>
+        </p:spPr>
+        <p:txBody>
+          <a:bodyPr wrap="square" lIns="182880" tIns="146304" rIns="182880" bIns="146304" rtlCol="0">
+            <a:spAutoFit/>
+          </a:bodyPr>
+          <a:lstStyle/>
+          <a:p>
+            <a:pPr>
+              <a:lnSpc>
+                <a:spcPct val="90000"/>
+              </a:lnSpc>
+              <a:spcAft>
+                <a:spcPts val="600"/>
+              </a:spcAft>
+            </a:pPr>
+            <a:r>
+              <a:rPr lang="en-US" sz="3600" dirty="0">
+                <a:latin typeface="+mj-lt"/>
+              </a:rPr>
+              <a:t>Abstract and learning objectives</a:t>
+            </a:r>
+          </a:p>
+          <a:p>
+            <a:pPr>
+              <a:lnSpc>
+                <a:spcPct val="90000"/>
+              </a:lnSpc>
+              <a:spcAft>
+                <a:spcPts val="600"/>
+              </a:spcAft>
+            </a:pPr>
+            <a:r>
+              <a:rPr lang="en-US" sz="2400" dirty="0">
+                <a:latin typeface="Segoe UI Semilight" panose="020B0402040204020203" pitchFamily="34" charset="0"/>
+                <a:cs typeface="Segoe UI Semilight" panose="020B0402040204020203" pitchFamily="34" charset="0"/>
+              </a:rPr>
+              <a:t>Facilitate discussion around top ADS tips &amp; tricks, leading to presentation on what makes a great ADS from requirements collection to architecture. </a:t>
+            </a:r>
+            <a:endParaRPr lang="en-US" sz="2400" dirty="0"/>
+          </a:p>
+        </p:txBody>
+      </p:sp>
+    </p:spTree>
+    <p:extLst>
+      <p:ext uri="{BB962C8B-B14F-4D97-AF65-F5344CB8AC3E}">
+        <p14:creationId xmlns:p14="http://schemas.microsoft.com/office/powerpoint/2010/main" val="772880493"/>
+      </p:ext>
+    </p:extLst>
+  </p:cSld>
+  <p:clrMapOvr>
+    <a:masterClrMapping/>
+  </p:clrMapOvr>
+  <mc:AlternateContent xmlns:mc="http://schemas.openxmlformats.org/markup-compatibility/2006" xmlns:p14="http://schemas.microsoft.com/office/powerpoint/2010/main">
+    <mc:Choice Requires="p14">
+      <p:transition p14:dur="0"/>
+    </mc:Choice>
+    <mc:Fallback xmlns="">
+      <p:transition/>
+    </mc:Fallback>
+  </mc:AlternateContent>
+</p:sld>
+</file>
+
+<file path=ppt/slides/slide20.xml><?xml version="1.0" encoding="utf-8"?>
 <p:sld xmlns:a="http://schemas.openxmlformats.org/drawingml/2006/main" xmlns:r="http://schemas.openxmlformats.org/officeDocument/2006/relationships" xmlns:p="http://schemas.openxmlformats.org/presentationml/2006/main">
   <p:cSld>
     <p:spTree>
@@ -20522,7 +20913,7 @@
             </a:r>
             <a:r>
               <a:rPr lang="en-US" dirty="0"/>
-              <a:t>?</a:t>
+              <a:t> when following up after an ADS?</a:t>
             </a:r>
           </a:p>
         </p:txBody>
@@ -20576,7 +20967,7 @@
     </p:spTree>
     <p:extLst>
       <p:ext uri="{BB962C8B-B14F-4D97-AF65-F5344CB8AC3E}">
-        <p14:creationId xmlns:p14="http://schemas.microsoft.com/office/powerpoint/2010/main" val="3706753644"/>
+        <p14:creationId xmlns:p14="http://schemas.microsoft.com/office/powerpoint/2010/main" val="929031561"/>
       </p:ext>
     </p:extLst>
   </p:cSld>
@@ -20589,7 +20980,7 @@
 </p:sld>
 </file>
 
-<file path=ppt/slides/slide19.xml><?xml version="1.0" encoding="utf-8"?>
+<file path=ppt/slides/slide21.xml><?xml version="1.0" encoding="utf-8"?>
 <p:sld xmlns:a="http://schemas.openxmlformats.org/drawingml/2006/main" xmlns:r="http://schemas.openxmlformats.org/officeDocument/2006/relationships" xmlns:p="http://schemas.openxmlformats.org/presentationml/2006/main">
   <p:cSld>
     <p:spTree>
@@ -20649,146 +21040,7 @@
 </p:sld>
 </file>
 
-<file path=ppt/slides/slide2.xml><?xml version="1.0" encoding="utf-8"?>
-<p:sld xmlns:a="http://schemas.openxmlformats.org/drawingml/2006/main" xmlns:r="http://schemas.openxmlformats.org/officeDocument/2006/relationships" xmlns:p="http://schemas.openxmlformats.org/presentationml/2006/main">
-  <p:cSld>
-    <p:bg>
-      <p:bgPr>
-        <a:solidFill>
-          <a:schemeClr val="bg2"/>
-        </a:solidFill>
-        <a:effectLst/>
-      </p:bgPr>
-    </p:bg>
-    <p:spTree>
-      <p:nvGrpSpPr>
-        <p:cNvPr id="1" name=""/>
-        <p:cNvGrpSpPr/>
-        <p:nvPr/>
-      </p:nvGrpSpPr>
-      <p:grpSpPr>
-        <a:xfrm>
-          <a:off x="0" y="0"/>
-          <a:ext cx="0" cy="0"/>
-          <a:chOff x="0" y="0"/>
-          <a:chExt cx="0" cy="0"/>
-        </a:xfrm>
-      </p:grpSpPr>
-      <p:sp>
-        <p:nvSpPr>
-          <p:cNvPr id="2" name="Title 1"/>
-          <p:cNvSpPr>
-            <a:spLocks noGrp="1"/>
-          </p:cNvSpPr>
-          <p:nvPr>
-            <p:ph type="title"/>
-          </p:nvPr>
-        </p:nvSpPr>
-        <p:spPr/>
-        <p:txBody>
-          <a:bodyPr>
-            <a:normAutofit/>
-          </a:bodyPr>
-          <a:lstStyle/>
-          <a:p>
-            <a:r>
-              <a:rPr lang="en-US" sz="4400" dirty="0">
-                <a:solidFill>
-                  <a:schemeClr val="tx1"/>
-                </a:solidFill>
-                <a:latin typeface="Segoe UI Light" panose="020B0502040204020203" pitchFamily="34" charset="0"/>
-                <a:cs typeface="Segoe UI Light" panose="020B0502040204020203" pitchFamily="34" charset="0"/>
-              </a:rPr>
-              <a:t>Abstract and learning objectives</a:t>
-            </a:r>
-          </a:p>
-        </p:txBody>
-      </p:sp>
-      <p:sp>
-        <p:nvSpPr>
-          <p:cNvPr id="9" name="TextBox 8">
-            <a:extLst>
-              <a:ext uri="{FF2B5EF4-FFF2-40B4-BE49-F238E27FC236}">
-                <a16:creationId xmlns:a16="http://schemas.microsoft.com/office/drawing/2014/main" id="{0F86F9F9-39B5-4CE6-AF48-9ADAE40EA728}"/>
-              </a:ext>
-            </a:extLst>
-          </p:cNvPr>
-          <p:cNvSpPr txBox="1"/>
-          <p:nvPr/>
-        </p:nvSpPr>
-        <p:spPr>
-          <a:xfrm>
-            <a:off x="340285" y="1741246"/>
-            <a:ext cx="7247965" cy="1868204"/>
-          </a:xfrm>
-          <a:prstGeom prst="rect">
-            <a:avLst/>
-          </a:prstGeom>
-          <a:noFill/>
-        </p:spPr>
-        <p:txBody>
-          <a:bodyPr wrap="square" lIns="182880" tIns="146304" rIns="182880" bIns="146304" rtlCol="0">
-            <a:spAutoFit/>
-          </a:bodyPr>
-          <a:lstStyle/>
-          <a:p>
-            <a:pPr>
-              <a:lnSpc>
-                <a:spcPct val="90000"/>
-              </a:lnSpc>
-              <a:spcAft>
-                <a:spcPts val="600"/>
-              </a:spcAft>
-            </a:pPr>
-            <a:r>
-              <a:rPr lang="en-US" sz="3600" dirty="0">
-                <a:latin typeface="+mj-lt"/>
-              </a:rPr>
-              <a:t>Abstract and learning objectives</a:t>
-            </a:r>
-          </a:p>
-          <a:p>
-            <a:pPr>
-              <a:lnSpc>
-                <a:spcPct val="90000"/>
-              </a:lnSpc>
-              <a:spcAft>
-                <a:spcPts val="600"/>
-              </a:spcAft>
-            </a:pPr>
-            <a:r>
-              <a:rPr lang="en-US" sz="2400" dirty="0">
-                <a:latin typeface="Segoe UI Semilight" panose="020B0402040204020203" pitchFamily="34" charset="0"/>
-                <a:cs typeface="Segoe UI Semilight" panose="020B0402040204020203" pitchFamily="34" charset="0"/>
-              </a:rPr>
-              <a:t>Facilitate discussion around top ADS tips &amp; tricks, leading to presentation on what makes a great ADS from requirements collection to architecture. </a:t>
-            </a:r>
-            <a:endParaRPr lang="en-US" sz="2400" dirty="0"/>
-          </a:p>
-        </p:txBody>
-      </p:sp>
-    </p:spTree>
-    <p:extLst>
-      <p:ext uri="{BB962C8B-B14F-4D97-AF65-F5344CB8AC3E}">
-        <p14:creationId xmlns:p14="http://schemas.microsoft.com/office/powerpoint/2010/main" val="772880493"/>
-      </p:ext>
-    </p:extLst>
-  </p:cSld>
-  <p:clrMapOvr>
-    <a:masterClrMapping/>
-  </p:clrMapOvr>
-  <mc:AlternateContent xmlns:mc="http://schemas.openxmlformats.org/markup-compatibility/2006" xmlns:p14="http://schemas.microsoft.com/office/powerpoint/2010/main">
-    <mc:Choice Requires="p14">
-      <p:transition p14:dur="0"/>
-    </mc:Choice>
-    <mc:Fallback xmlns="">
-      <p:transition/>
-    </mc:Fallback>
-  </mc:AlternateContent>
-</p:sld>
-</file>
-
-<file path=ppt/slides/slide20.xml><?xml version="1.0" encoding="utf-8"?>
+<file path=ppt/slides/slide22.xml><?xml version="1.0" encoding="utf-8"?>
 <p:sld xmlns:a="http://schemas.openxmlformats.org/drawingml/2006/main" xmlns:r="http://schemas.openxmlformats.org/officeDocument/2006/relationships" xmlns:p="http://schemas.openxmlformats.org/presentationml/2006/main">
   <p:cSld>
     <p:spTree>
@@ -21095,7 +21347,7 @@
 </p:sld>
 </file>
 
-<file path=ppt/slides/slide21.xml><?xml version="1.0" encoding="utf-8"?>
+<file path=ppt/slides/slide23.xml><?xml version="1.0" encoding="utf-8"?>
 <p:sld xmlns:a="http://schemas.openxmlformats.org/drawingml/2006/main" xmlns:r="http://schemas.openxmlformats.org/officeDocument/2006/relationships" xmlns:p="http://schemas.openxmlformats.org/presentationml/2006/main">
   <p:cSld>
     <p:spTree>
@@ -21404,7 +21656,7 @@
 </p:sld>
 </file>
 
-<file path=ppt/slides/slide22.xml><?xml version="1.0" encoding="utf-8"?>
+<file path=ppt/slides/slide24.xml><?xml version="1.0" encoding="utf-8"?>
 <p:sld xmlns:a="http://schemas.openxmlformats.org/drawingml/2006/main" xmlns:r="http://schemas.openxmlformats.org/officeDocument/2006/relationships" xmlns:p="http://schemas.openxmlformats.org/presentationml/2006/main">
   <p:cSld>
     <p:spTree>
@@ -21652,7 +21904,7 @@
 </p:sld>
 </file>
 
-<file path=ppt/slides/slide23.xml><?xml version="1.0" encoding="utf-8"?>
+<file path=ppt/slides/slide25.xml><?xml version="1.0" encoding="utf-8"?>
 <p:sld xmlns:a="http://schemas.openxmlformats.org/drawingml/2006/main" xmlns:r="http://schemas.openxmlformats.org/officeDocument/2006/relationships" xmlns:p="http://schemas.openxmlformats.org/presentationml/2006/main">
   <p:cSld>
     <p:spTree>
@@ -25111,15 +25363,6 @@
 </file>
 
 <file path=customXml/item1.xml><?xml version="1.0" encoding="utf-8"?>
-<p:properties xmlns:p="http://schemas.microsoft.com/office/2006/metadata/properties" xmlns:xsi="http://www.w3.org/2001/XMLSchema-instance" xmlns:pc="http://schemas.microsoft.com/office/infopath/2007/PartnerControls">
-  <documentManagement>
-    <_ip_UnifiedCompliancePolicyUIAction xmlns="http://schemas.microsoft.com/sharepoint/v3" xsi:nil="true"/>
-    <_ip_UnifiedCompliancePolicyProperties xmlns="http://schemas.microsoft.com/sharepoint/v3" xsi:nil="true"/>
-  </documentManagement>
-</p:properties>
-</file>
-
-<file path=customXml/item2.xml><?xml version="1.0" encoding="utf-8"?>
 <ct:contentTypeSchema xmlns:ct="http://schemas.microsoft.com/office/2006/metadata/contentType" xmlns:ma="http://schemas.microsoft.com/office/2006/metadata/properties/metaAttributes" ct:_="" ma:_="" ma:contentTypeName="Document" ma:contentTypeID="0x010100D15DFA3690A15B4081582BBCC6BEAC3E" ma:contentTypeVersion="9" ma:contentTypeDescription="Create a new document." ma:contentTypeScope="" ma:versionID="642da1784587cbe85a7fdbbe4dc36103">
   <xsd:schema xmlns:xsd="http://www.w3.org/2001/XMLSchema" xmlns:xs="http://www.w3.org/2001/XMLSchema" xmlns:p="http://schemas.microsoft.com/office/2006/metadata/properties" xmlns:ns1="http://schemas.microsoft.com/sharepoint/v3" xmlns:ns2="2023ac63-7b75-4916-a9ee-591457758eee" xmlns:ns3="d9c797ad-d7c3-4982-82b7-81352a75e4a5" targetNamespace="http://schemas.microsoft.com/office/2006/metadata/properties" ma:root="true" ma:fieldsID="91198b0246576053cc55dd2c67035a89" ns1:_="" ns2:_="" ns3:_="">
     <xsd:import namespace="http://schemas.microsoft.com/sharepoint/v3"/>
@@ -25321,6 +25564,15 @@
 </ct:contentTypeSchema>
 </file>
 
+<file path=customXml/item2.xml><?xml version="1.0" encoding="utf-8"?>
+<p:properties xmlns:p="http://schemas.microsoft.com/office/2006/metadata/properties" xmlns:xsi="http://www.w3.org/2001/XMLSchema-instance" xmlns:pc="http://schemas.microsoft.com/office/infopath/2007/PartnerControls">
+  <documentManagement>
+    <_ip_UnifiedCompliancePolicyUIAction xmlns="http://schemas.microsoft.com/sharepoint/v3" xsi:nil="true"/>
+    <_ip_UnifiedCompliancePolicyProperties xmlns="http://schemas.microsoft.com/sharepoint/v3" xsi:nil="true"/>
+  </documentManagement>
+</p:properties>
+</file>
+
 <file path=customXml/item3.xml><?xml version="1.0" encoding="utf-8"?>
 <?mso-contentType ?>
 <FormTemplates xmlns="http://schemas.microsoft.com/sharepoint/v3/contenttype/forms">
@@ -25331,24 +25583,6 @@
 </file>
 
 <file path=customXml/itemProps1.xml><?xml version="1.0" encoding="utf-8"?>
-<ds:datastoreItem xmlns:ds="http://schemas.openxmlformats.org/officeDocument/2006/customXml" ds:itemID="{BAF7D529-36AB-45DA-B239-2F912F2D1610}">
-  <ds:schemaRefs>
-    <ds:schemaRef ds:uri="http://purl.org/dc/elements/1.1/"/>
-    <ds:schemaRef ds:uri="http://schemas.microsoft.com/office/2006/metadata/properties"/>
-    <ds:schemaRef ds:uri="http://purl.org/dc/terms/"/>
-    <ds:schemaRef ds:uri="http://schemas.microsoft.com/office/infopath/2007/PartnerControls"/>
-    <ds:schemaRef ds:uri="http://purl.org/dc/dcmitype/"/>
-    <ds:schemaRef ds:uri="http://schemas.openxmlformats.org/package/2006/metadata/core-properties"/>
-    <ds:schemaRef ds:uri="http://schemas.microsoft.com/office/2006/documentManagement/types"/>
-    <ds:schemaRef ds:uri="d9c797ad-d7c3-4982-82b7-81352a75e4a5"/>
-    <ds:schemaRef ds:uri="2023ac63-7b75-4916-a9ee-591457758eee"/>
-    <ds:schemaRef ds:uri="http://schemas.microsoft.com/sharepoint/v3"/>
-    <ds:schemaRef ds:uri="http://www.w3.org/XML/1998/namespace"/>
-  </ds:schemaRefs>
-</ds:datastoreItem>
-</file>
-
-<file path=customXml/itemProps2.xml><?xml version="1.0" encoding="utf-8"?>
 <ds:datastoreItem xmlns:ds="http://schemas.openxmlformats.org/officeDocument/2006/customXml" ds:itemID="{255F5BEB-6AD6-480A-8556-C80C5EBC10F2}">
   <ds:schemaRefs>
     <ds:schemaRef ds:uri="http://schemas.microsoft.com/office/2006/metadata/contentType"/>
@@ -25368,6 +25602,24 @@
 </ds:datastoreItem>
 </file>
 
+<file path=customXml/itemProps2.xml><?xml version="1.0" encoding="utf-8"?>
+<ds:datastoreItem xmlns:ds="http://schemas.openxmlformats.org/officeDocument/2006/customXml" ds:itemID="{BAF7D529-36AB-45DA-B239-2F912F2D1610}">
+  <ds:schemaRefs>
+    <ds:schemaRef ds:uri="http://purl.org/dc/elements/1.1/"/>
+    <ds:schemaRef ds:uri="http://schemas.microsoft.com/office/2006/metadata/properties"/>
+    <ds:schemaRef ds:uri="http://purl.org/dc/terms/"/>
+    <ds:schemaRef ds:uri="http://schemas.microsoft.com/office/infopath/2007/PartnerControls"/>
+    <ds:schemaRef ds:uri="http://purl.org/dc/dcmitype/"/>
+    <ds:schemaRef ds:uri="http://schemas.openxmlformats.org/package/2006/metadata/core-properties"/>
+    <ds:schemaRef ds:uri="http://schemas.microsoft.com/office/2006/documentManagement/types"/>
+    <ds:schemaRef ds:uri="d9c797ad-d7c3-4982-82b7-81352a75e4a5"/>
+    <ds:schemaRef ds:uri="2023ac63-7b75-4916-a9ee-591457758eee"/>
+    <ds:schemaRef ds:uri="http://schemas.microsoft.com/sharepoint/v3"/>
+    <ds:schemaRef ds:uri="http://www.w3.org/XML/1998/namespace"/>
+  </ds:schemaRefs>
+</ds:datastoreItem>
+</file>
+
 <file path=customXml/itemProps3.xml><?xml version="1.0" encoding="utf-8"?>
 <ds:datastoreItem xmlns:ds="http://schemas.openxmlformats.org/officeDocument/2006/customXml" ds:itemID="{F18501AF-04CF-4482-BAE1-607B49DDC378}">
   <ds:schemaRefs>

</xml_diff>

<commit_message>
updated ads and wb decks
</commit_message>
<xml_diff>
--- a/Financial service modernization workshop/mastering-the-ads-deck.pptx
+++ b/Financial service modernization workshop/mastering-the-ads-deck.pptx
@@ -6,7 +6,7 @@
     <p:sldMasterId id="2147483665" r:id="rId5"/>
   </p:sldMasterIdLst>
   <p:notesMasterIdLst>
-    <p:notesMasterId r:id="rId31"/>
+    <p:notesMasterId r:id="rId25"/>
   </p:notesMasterIdLst>
   <p:sldIdLst>
     <p:sldId id="300" r:id="rId6"/>
@@ -20,20 +20,14 @@
     <p:sldId id="335" r:id="rId14"/>
     <p:sldId id="357" r:id="rId15"/>
     <p:sldId id="329" r:id="rId16"/>
-    <p:sldId id="330" r:id="rId17"/>
-    <p:sldId id="336" r:id="rId18"/>
-    <p:sldId id="337" r:id="rId19"/>
-    <p:sldId id="338" r:id="rId20"/>
-    <p:sldId id="356" r:id="rId21"/>
-    <p:sldId id="358" r:id="rId22"/>
-    <p:sldId id="331" r:id="rId23"/>
-    <p:sldId id="339" r:id="rId24"/>
-    <p:sldId id="359" r:id="rId25"/>
-    <p:sldId id="340" r:id="rId26"/>
-    <p:sldId id="341" r:id="rId27"/>
-    <p:sldId id="343" r:id="rId28"/>
-    <p:sldId id="344" r:id="rId29"/>
-    <p:sldId id="345" r:id="rId30"/>
+    <p:sldId id="336" r:id="rId17"/>
+    <p:sldId id="337" r:id="rId18"/>
+    <p:sldId id="338" r:id="rId19"/>
+    <p:sldId id="356" r:id="rId20"/>
+    <p:sldId id="358" r:id="rId21"/>
+    <p:sldId id="331" r:id="rId22"/>
+    <p:sldId id="339" r:id="rId23"/>
+    <p:sldId id="359" r:id="rId24"/>
   </p:sldIdLst>
   <p:sldSz cx="12192000" cy="6858000"/>
   <p:notesSz cx="6858000" cy="9144000"/>
@@ -148,7 +142,6 @@
             <p14:sldId id="335"/>
             <p14:sldId id="357"/>
             <p14:sldId id="329"/>
-            <p14:sldId id="330"/>
             <p14:sldId id="336"/>
             <p14:sldId id="337"/>
             <p14:sldId id="338"/>
@@ -157,15 +150,6 @@
             <p14:sldId id="331"/>
             <p14:sldId id="339"/>
             <p14:sldId id="359"/>
-          </p14:sldIdLst>
-        </p14:section>
-        <p14:section name="Structure &amp; Execute PoC" id="{8D57AF76-163A-44AB-8C7D-1071192B289B}">
-          <p14:sldIdLst>
-            <p14:sldId id="340"/>
-            <p14:sldId id="341"/>
-            <p14:sldId id="343"/>
-            <p14:sldId id="344"/>
-            <p14:sldId id="345"/>
           </p14:sldIdLst>
         </p14:section>
       </p14:sectionLst>
@@ -3276,7 +3260,7 @@
           <a:p>
             <a:fld id="{52A13B17-C506-4D51-BB37-16B365906619}" type="datetimeFigureOut">
               <a:rPr lang="en-US" smtClean="0"/>
-              <a:t>8/24/2018</a:t>
+              <a:t>8/27/2018</a:t>
             </a:fld>
             <a:endParaRPr lang="en-US"/>
           </a:p>
@@ -3687,487 +3671,6 @@
 </p:notes>
 </file>
 
-<file path=ppt/notesSlides/notesSlide10.xml><?xml version="1.0" encoding="utf-8"?>
-<p:notes xmlns:a="http://schemas.openxmlformats.org/drawingml/2006/main" xmlns:r="http://schemas.openxmlformats.org/officeDocument/2006/relationships" xmlns:p="http://schemas.openxmlformats.org/presentationml/2006/main">
-  <p:cSld>
-    <p:spTree>
-      <p:nvGrpSpPr>
-        <p:cNvPr id="1" name=""/>
-        <p:cNvGrpSpPr/>
-        <p:nvPr/>
-      </p:nvGrpSpPr>
-      <p:grpSpPr>
-        <a:xfrm>
-          <a:off x="0" y="0"/>
-          <a:ext cx="0" cy="0"/>
-          <a:chOff x="0" y="0"/>
-          <a:chExt cx="0" cy="0"/>
-        </a:xfrm>
-      </p:grpSpPr>
-      <p:sp>
-        <p:nvSpPr>
-          <p:cNvPr id="2" name="Slide Image Placeholder 1"/>
-          <p:cNvSpPr>
-            <a:spLocks noGrp="1" noRot="1" noChangeAspect="1"/>
-          </p:cNvSpPr>
-          <p:nvPr>
-            <p:ph type="sldImg"/>
-          </p:nvPr>
-        </p:nvSpPr>
-        <p:spPr/>
-      </p:sp>
-      <p:sp>
-        <p:nvSpPr>
-          <p:cNvPr id="3" name="Notes Placeholder 2"/>
-          <p:cNvSpPr>
-            <a:spLocks noGrp="1"/>
-          </p:cNvSpPr>
-          <p:nvPr>
-            <p:ph type="body" idx="1"/>
-          </p:nvPr>
-        </p:nvSpPr>
-        <p:spPr/>
-        <p:txBody>
-          <a:bodyPr/>
-          <a:lstStyle/>
-          <a:p>
-            <a:endParaRPr lang="en-US" dirty="0"/>
-          </a:p>
-        </p:txBody>
-      </p:sp>
-      <p:sp>
-        <p:nvSpPr>
-          <p:cNvPr id="4" name="Slide Number Placeholder 3"/>
-          <p:cNvSpPr>
-            <a:spLocks noGrp="1"/>
-          </p:cNvSpPr>
-          <p:nvPr>
-            <p:ph type="sldNum" sz="quarter" idx="10"/>
-          </p:nvPr>
-        </p:nvSpPr>
-        <p:spPr/>
-        <p:txBody>
-          <a:bodyPr/>
-          <a:lstStyle/>
-          <a:p>
-            <a:fld id="{D9EB630B-BF71-A34E-9F10-CD6A3DB979CB}" type="slidenum">
-              <a:rPr lang="en-US" smtClean="0"/>
-              <a:t>19</a:t>
-            </a:fld>
-            <a:endParaRPr lang="en-US"/>
-          </a:p>
-        </p:txBody>
-      </p:sp>
-    </p:spTree>
-    <p:extLst>
-      <p:ext uri="{BB962C8B-B14F-4D97-AF65-F5344CB8AC3E}">
-        <p14:creationId xmlns:p14="http://schemas.microsoft.com/office/powerpoint/2010/main" val="704830805"/>
-      </p:ext>
-    </p:extLst>
-  </p:cSld>
-  <p:clrMapOvr>
-    <a:masterClrMapping/>
-  </p:clrMapOvr>
-</p:notes>
-</file>
-
-<file path=ppt/notesSlides/notesSlide11.xml><?xml version="1.0" encoding="utf-8"?>
-<p:notes xmlns:a="http://schemas.openxmlformats.org/drawingml/2006/main" xmlns:r="http://schemas.openxmlformats.org/officeDocument/2006/relationships" xmlns:p="http://schemas.openxmlformats.org/presentationml/2006/main">
-  <p:cSld>
-    <p:spTree>
-      <p:nvGrpSpPr>
-        <p:cNvPr id="1" name=""/>
-        <p:cNvGrpSpPr/>
-        <p:nvPr/>
-      </p:nvGrpSpPr>
-      <p:grpSpPr>
-        <a:xfrm>
-          <a:off x="0" y="0"/>
-          <a:ext cx="0" cy="0"/>
-          <a:chOff x="0" y="0"/>
-          <a:chExt cx="0" cy="0"/>
-        </a:xfrm>
-      </p:grpSpPr>
-      <p:sp>
-        <p:nvSpPr>
-          <p:cNvPr id="2" name="Slide Image Placeholder 1"/>
-          <p:cNvSpPr>
-            <a:spLocks noGrp="1" noRot="1" noChangeAspect="1"/>
-          </p:cNvSpPr>
-          <p:nvPr>
-            <p:ph type="sldImg"/>
-          </p:nvPr>
-        </p:nvSpPr>
-        <p:spPr/>
-      </p:sp>
-      <p:sp>
-        <p:nvSpPr>
-          <p:cNvPr id="3" name="Notes Placeholder 2"/>
-          <p:cNvSpPr>
-            <a:spLocks noGrp="1"/>
-          </p:cNvSpPr>
-          <p:nvPr>
-            <p:ph type="body" idx="1"/>
-          </p:nvPr>
-        </p:nvSpPr>
-        <p:spPr/>
-        <p:txBody>
-          <a:bodyPr/>
-          <a:lstStyle/>
-          <a:p>
-            <a:endParaRPr lang="en-US" dirty="0"/>
-          </a:p>
-        </p:txBody>
-      </p:sp>
-    </p:spTree>
-    <p:extLst>
-      <p:ext uri="{BB962C8B-B14F-4D97-AF65-F5344CB8AC3E}">
-        <p14:creationId xmlns:p14="http://schemas.microsoft.com/office/powerpoint/2010/main" val="1949601372"/>
-      </p:ext>
-    </p:extLst>
-  </p:cSld>
-  <p:clrMapOvr>
-    <a:masterClrMapping/>
-  </p:clrMapOvr>
-</p:notes>
-</file>
-
-<file path=ppt/notesSlides/notesSlide12.xml><?xml version="1.0" encoding="utf-8"?>
-<p:notes xmlns:a="http://schemas.openxmlformats.org/drawingml/2006/main" xmlns:r="http://schemas.openxmlformats.org/officeDocument/2006/relationships" xmlns:p="http://schemas.openxmlformats.org/presentationml/2006/main">
-  <p:cSld>
-    <p:spTree>
-      <p:nvGrpSpPr>
-        <p:cNvPr id="1" name=""/>
-        <p:cNvGrpSpPr/>
-        <p:nvPr/>
-      </p:nvGrpSpPr>
-      <p:grpSpPr>
-        <a:xfrm>
-          <a:off x="0" y="0"/>
-          <a:ext cx="0" cy="0"/>
-          <a:chOff x="0" y="0"/>
-          <a:chExt cx="0" cy="0"/>
-        </a:xfrm>
-      </p:grpSpPr>
-      <p:sp>
-        <p:nvSpPr>
-          <p:cNvPr id="2" name="Slide Image Placeholder 1"/>
-          <p:cNvSpPr>
-            <a:spLocks noGrp="1" noRot="1" noChangeAspect="1"/>
-          </p:cNvSpPr>
-          <p:nvPr>
-            <p:ph type="sldImg"/>
-          </p:nvPr>
-        </p:nvSpPr>
-        <p:spPr/>
-      </p:sp>
-      <p:sp>
-        <p:nvSpPr>
-          <p:cNvPr id="3" name="Notes Placeholder 2"/>
-          <p:cNvSpPr>
-            <a:spLocks noGrp="1"/>
-          </p:cNvSpPr>
-          <p:nvPr>
-            <p:ph type="body" idx="1"/>
-          </p:nvPr>
-        </p:nvSpPr>
-        <p:spPr/>
-        <p:txBody>
-          <a:bodyPr/>
-          <a:lstStyle/>
-          <a:p>
-            <a:endParaRPr lang="en-US" dirty="0"/>
-          </a:p>
-        </p:txBody>
-      </p:sp>
-      <p:sp>
-        <p:nvSpPr>
-          <p:cNvPr id="4" name="Slide Number Placeholder 3"/>
-          <p:cNvSpPr>
-            <a:spLocks noGrp="1"/>
-          </p:cNvSpPr>
-          <p:nvPr>
-            <p:ph type="sldNum" sz="quarter" idx="10"/>
-          </p:nvPr>
-        </p:nvSpPr>
-        <p:spPr/>
-        <p:txBody>
-          <a:bodyPr/>
-          <a:lstStyle/>
-          <a:p>
-            <a:fld id="{D9EB630B-BF71-A34E-9F10-CD6A3DB979CB}" type="slidenum">
-              <a:rPr lang="en-US" smtClean="0"/>
-              <a:t>22</a:t>
-            </a:fld>
-            <a:endParaRPr lang="en-US"/>
-          </a:p>
-        </p:txBody>
-      </p:sp>
-    </p:spTree>
-    <p:extLst>
-      <p:ext uri="{BB962C8B-B14F-4D97-AF65-F5344CB8AC3E}">
-        <p14:creationId xmlns:p14="http://schemas.microsoft.com/office/powerpoint/2010/main" val="2485391194"/>
-      </p:ext>
-    </p:extLst>
-  </p:cSld>
-  <p:clrMapOvr>
-    <a:masterClrMapping/>
-  </p:clrMapOvr>
-</p:notes>
-</file>
-
-<file path=ppt/notesSlides/notesSlide13.xml><?xml version="1.0" encoding="utf-8"?>
-<p:notes xmlns:a="http://schemas.openxmlformats.org/drawingml/2006/main" xmlns:r="http://schemas.openxmlformats.org/officeDocument/2006/relationships" xmlns:p="http://schemas.openxmlformats.org/presentationml/2006/main">
-  <p:cSld>
-    <p:spTree>
-      <p:nvGrpSpPr>
-        <p:cNvPr id="1" name=""/>
-        <p:cNvGrpSpPr/>
-        <p:nvPr/>
-      </p:nvGrpSpPr>
-      <p:grpSpPr>
-        <a:xfrm>
-          <a:off x="0" y="0"/>
-          <a:ext cx="0" cy="0"/>
-          <a:chOff x="0" y="0"/>
-          <a:chExt cx="0" cy="0"/>
-        </a:xfrm>
-      </p:grpSpPr>
-      <p:sp>
-        <p:nvSpPr>
-          <p:cNvPr id="2" name="Slide Image Placeholder 1"/>
-          <p:cNvSpPr>
-            <a:spLocks noGrp="1" noRot="1" noChangeAspect="1"/>
-          </p:cNvSpPr>
-          <p:nvPr>
-            <p:ph type="sldImg"/>
-          </p:nvPr>
-        </p:nvSpPr>
-        <p:spPr/>
-      </p:sp>
-      <p:sp>
-        <p:nvSpPr>
-          <p:cNvPr id="3" name="Notes Placeholder 2"/>
-          <p:cNvSpPr>
-            <a:spLocks noGrp="1"/>
-          </p:cNvSpPr>
-          <p:nvPr>
-            <p:ph type="body" idx="1"/>
-          </p:nvPr>
-        </p:nvSpPr>
-        <p:spPr/>
-        <p:txBody>
-          <a:bodyPr/>
-          <a:lstStyle/>
-          <a:p>
-            <a:endParaRPr lang="en-US" dirty="0"/>
-          </a:p>
-        </p:txBody>
-      </p:sp>
-      <p:sp>
-        <p:nvSpPr>
-          <p:cNvPr id="4" name="Slide Number Placeholder 3"/>
-          <p:cNvSpPr>
-            <a:spLocks noGrp="1"/>
-          </p:cNvSpPr>
-          <p:nvPr>
-            <p:ph type="sldNum" sz="quarter" idx="10"/>
-          </p:nvPr>
-        </p:nvSpPr>
-        <p:spPr/>
-        <p:txBody>
-          <a:bodyPr/>
-          <a:lstStyle/>
-          <a:p>
-            <a:fld id="{D9EB630B-BF71-A34E-9F10-CD6A3DB979CB}" type="slidenum">
-              <a:rPr lang="en-US" smtClean="0"/>
-              <a:t>23</a:t>
-            </a:fld>
-            <a:endParaRPr lang="en-US"/>
-          </a:p>
-        </p:txBody>
-      </p:sp>
-    </p:spTree>
-    <p:extLst>
-      <p:ext uri="{BB962C8B-B14F-4D97-AF65-F5344CB8AC3E}">
-        <p14:creationId xmlns:p14="http://schemas.microsoft.com/office/powerpoint/2010/main" val="1566328013"/>
-      </p:ext>
-    </p:extLst>
-  </p:cSld>
-  <p:clrMapOvr>
-    <a:masterClrMapping/>
-  </p:clrMapOvr>
-</p:notes>
-</file>
-
-<file path=ppt/notesSlides/notesSlide14.xml><?xml version="1.0" encoding="utf-8"?>
-<p:notes xmlns:a="http://schemas.openxmlformats.org/drawingml/2006/main" xmlns:r="http://schemas.openxmlformats.org/officeDocument/2006/relationships" xmlns:p="http://schemas.openxmlformats.org/presentationml/2006/main">
-  <p:cSld>
-    <p:spTree>
-      <p:nvGrpSpPr>
-        <p:cNvPr id="1" name=""/>
-        <p:cNvGrpSpPr/>
-        <p:nvPr/>
-      </p:nvGrpSpPr>
-      <p:grpSpPr>
-        <a:xfrm>
-          <a:off x="0" y="0"/>
-          <a:ext cx="0" cy="0"/>
-          <a:chOff x="0" y="0"/>
-          <a:chExt cx="0" cy="0"/>
-        </a:xfrm>
-      </p:grpSpPr>
-      <p:sp>
-        <p:nvSpPr>
-          <p:cNvPr id="2" name="Slide Image Placeholder 1"/>
-          <p:cNvSpPr>
-            <a:spLocks noGrp="1" noRot="1" noChangeAspect="1"/>
-          </p:cNvSpPr>
-          <p:nvPr>
-            <p:ph type="sldImg"/>
-          </p:nvPr>
-        </p:nvSpPr>
-        <p:spPr/>
-      </p:sp>
-      <p:sp>
-        <p:nvSpPr>
-          <p:cNvPr id="3" name="Notes Placeholder 2"/>
-          <p:cNvSpPr>
-            <a:spLocks noGrp="1"/>
-          </p:cNvSpPr>
-          <p:nvPr>
-            <p:ph type="body" idx="1"/>
-          </p:nvPr>
-        </p:nvSpPr>
-        <p:spPr/>
-        <p:txBody>
-          <a:bodyPr/>
-          <a:lstStyle/>
-          <a:p>
-            <a:endParaRPr lang="en-US" dirty="0"/>
-          </a:p>
-        </p:txBody>
-      </p:sp>
-      <p:sp>
-        <p:nvSpPr>
-          <p:cNvPr id="4" name="Slide Number Placeholder 3"/>
-          <p:cNvSpPr>
-            <a:spLocks noGrp="1"/>
-          </p:cNvSpPr>
-          <p:nvPr>
-            <p:ph type="sldNum" sz="quarter" idx="10"/>
-          </p:nvPr>
-        </p:nvSpPr>
-        <p:spPr/>
-        <p:txBody>
-          <a:bodyPr/>
-          <a:lstStyle/>
-          <a:p>
-            <a:fld id="{D9EB630B-BF71-A34E-9F10-CD6A3DB979CB}" type="slidenum">
-              <a:rPr lang="en-US" smtClean="0"/>
-              <a:t>24</a:t>
-            </a:fld>
-            <a:endParaRPr lang="en-US"/>
-          </a:p>
-        </p:txBody>
-      </p:sp>
-    </p:spTree>
-    <p:extLst>
-      <p:ext uri="{BB962C8B-B14F-4D97-AF65-F5344CB8AC3E}">
-        <p14:creationId xmlns:p14="http://schemas.microsoft.com/office/powerpoint/2010/main" val="1713873747"/>
-      </p:ext>
-    </p:extLst>
-  </p:cSld>
-  <p:clrMapOvr>
-    <a:masterClrMapping/>
-  </p:clrMapOvr>
-</p:notes>
-</file>
-
-<file path=ppt/notesSlides/notesSlide15.xml><?xml version="1.0" encoding="utf-8"?>
-<p:notes xmlns:a="http://schemas.openxmlformats.org/drawingml/2006/main" xmlns:r="http://schemas.openxmlformats.org/officeDocument/2006/relationships" xmlns:p="http://schemas.openxmlformats.org/presentationml/2006/main">
-  <p:cSld>
-    <p:spTree>
-      <p:nvGrpSpPr>
-        <p:cNvPr id="1" name=""/>
-        <p:cNvGrpSpPr/>
-        <p:nvPr/>
-      </p:nvGrpSpPr>
-      <p:grpSpPr>
-        <a:xfrm>
-          <a:off x="0" y="0"/>
-          <a:ext cx="0" cy="0"/>
-          <a:chOff x="0" y="0"/>
-          <a:chExt cx="0" cy="0"/>
-        </a:xfrm>
-      </p:grpSpPr>
-      <p:sp>
-        <p:nvSpPr>
-          <p:cNvPr id="2" name="Slide Image Placeholder 1"/>
-          <p:cNvSpPr>
-            <a:spLocks noGrp="1" noRot="1" noChangeAspect="1"/>
-          </p:cNvSpPr>
-          <p:nvPr>
-            <p:ph type="sldImg"/>
-          </p:nvPr>
-        </p:nvSpPr>
-        <p:spPr/>
-      </p:sp>
-      <p:sp>
-        <p:nvSpPr>
-          <p:cNvPr id="3" name="Notes Placeholder 2"/>
-          <p:cNvSpPr>
-            <a:spLocks noGrp="1"/>
-          </p:cNvSpPr>
-          <p:nvPr>
-            <p:ph type="body" idx="1"/>
-          </p:nvPr>
-        </p:nvSpPr>
-        <p:spPr/>
-        <p:txBody>
-          <a:bodyPr/>
-          <a:lstStyle/>
-          <a:p>
-            <a:endParaRPr lang="en-US" dirty="0"/>
-          </a:p>
-        </p:txBody>
-      </p:sp>
-      <p:sp>
-        <p:nvSpPr>
-          <p:cNvPr id="4" name="Slide Number Placeholder 3"/>
-          <p:cNvSpPr>
-            <a:spLocks noGrp="1"/>
-          </p:cNvSpPr>
-          <p:nvPr>
-            <p:ph type="sldNum" sz="quarter" idx="10"/>
-          </p:nvPr>
-        </p:nvSpPr>
-        <p:spPr/>
-        <p:txBody>
-          <a:bodyPr/>
-          <a:lstStyle/>
-          <a:p>
-            <a:fld id="{D9EB630B-BF71-A34E-9F10-CD6A3DB979CB}" type="slidenum">
-              <a:rPr lang="en-US" smtClean="0"/>
-              <a:t>25</a:t>
-            </a:fld>
-            <a:endParaRPr lang="en-US"/>
-          </a:p>
-        </p:txBody>
-      </p:sp>
-    </p:spTree>
-    <p:extLst>
-      <p:ext uri="{BB962C8B-B14F-4D97-AF65-F5344CB8AC3E}">
-        <p14:creationId xmlns:p14="http://schemas.microsoft.com/office/powerpoint/2010/main" val="1134149270"/>
-      </p:ext>
-    </p:extLst>
-  </p:cSld>
-  <p:clrMapOvr>
-    <a:masterClrMapping/>
-  </p:clrMapOvr>
-</p:notes>
-</file>
-
 <file path=ppt/notesSlides/notesSlide2.xml><?xml version="1.0" encoding="utf-8"?>
 <p:notes xmlns:a="http://schemas.openxmlformats.org/drawingml/2006/main" xmlns:r="http://schemas.openxmlformats.org/officeDocument/2006/relationships" xmlns:p="http://schemas.openxmlformats.org/presentationml/2006/main">
   <p:cSld>
@@ -4464,276 +3967,6 @@
           <a:bodyPr/>
           <a:lstStyle/>
           <a:p>
-            <a:r>
-              <a:rPr lang="en-US" sz="1200" b="1" i="0" u="none" strike="noStrike" kern="1200" baseline="0" dirty="0">
-                <a:solidFill>
-                  <a:schemeClr val="tx1"/>
-                </a:solidFill>
-                <a:latin typeface="+mn-lt"/>
-                <a:ea typeface="+mn-ea"/>
-                <a:cs typeface="+mn-cs"/>
-              </a:rPr>
-              <a:t>1. Project goal</a:t>
-            </a:r>
-            <a:endParaRPr lang="en-US" sz="1200" b="0" i="0" u="none" strike="noStrike" kern="1200" baseline="0" dirty="0">
-              <a:solidFill>
-                <a:schemeClr val="tx1"/>
-              </a:solidFill>
-              <a:latin typeface="+mn-lt"/>
-              <a:ea typeface="+mn-ea"/>
-              <a:cs typeface="+mn-cs"/>
-            </a:endParaRPr>
-          </a:p>
-          <a:p>
-            <a:r>
-              <a:rPr lang="en-US" sz="1200" b="0" i="0" u="none" strike="noStrike" kern="1200" baseline="0" dirty="0">
-                <a:solidFill>
-                  <a:schemeClr val="tx1"/>
-                </a:solidFill>
-                <a:latin typeface="+mn-lt"/>
-                <a:ea typeface="+mn-ea"/>
-                <a:cs typeface="+mn-cs"/>
-              </a:rPr>
-              <a:t>Write down the project goal to help focus everyone to the desired outcomes. </a:t>
-            </a:r>
-          </a:p>
-          <a:p>
-            <a:r>
-              <a:rPr lang="en-US" sz="1200" b="1" i="0" u="none" strike="noStrike" kern="1200" baseline="0" dirty="0">
-                <a:solidFill>
-                  <a:schemeClr val="tx1"/>
-                </a:solidFill>
-                <a:latin typeface="+mn-lt"/>
-                <a:ea typeface="+mn-ea"/>
-                <a:cs typeface="+mn-cs"/>
-              </a:rPr>
-              <a:t>2. Requirements and concerns</a:t>
-            </a:r>
-            <a:endParaRPr lang="en-US" sz="1200" b="0" i="0" u="none" strike="noStrike" kern="1200" baseline="0" dirty="0">
-              <a:solidFill>
-                <a:schemeClr val="tx1"/>
-              </a:solidFill>
-              <a:latin typeface="+mn-lt"/>
-              <a:ea typeface="+mn-ea"/>
-              <a:cs typeface="+mn-cs"/>
-            </a:endParaRPr>
-          </a:p>
-          <a:p>
-            <a:r>
-              <a:rPr lang="en-US" sz="1200" b="0" i="0" u="none" strike="noStrike" kern="1200" baseline="0" dirty="0">
-                <a:solidFill>
-                  <a:schemeClr val="tx1"/>
-                </a:solidFill>
-                <a:latin typeface="+mn-lt"/>
-                <a:ea typeface="+mn-ea"/>
-                <a:cs typeface="+mn-cs"/>
-              </a:rPr>
-              <a:t>Begin with the items you’ve listed from the pre-call. Make sure that everyone gets a chance to be heard. Write down names next to each person’s requirements or concerns. </a:t>
-            </a:r>
-          </a:p>
-          <a:p>
-            <a:r>
-              <a:rPr lang="en-US" sz="1200" b="1" i="0" u="none" strike="noStrike" kern="1200" baseline="0" dirty="0">
-                <a:solidFill>
-                  <a:schemeClr val="tx1"/>
-                </a:solidFill>
-                <a:latin typeface="+mn-lt"/>
-                <a:ea typeface="+mn-ea"/>
-                <a:cs typeface="+mn-cs"/>
-              </a:rPr>
-              <a:t>3. Parking lot </a:t>
-            </a:r>
-            <a:endParaRPr lang="en-US" sz="1200" b="0" i="0" u="none" strike="noStrike" kern="1200" baseline="0" dirty="0">
-              <a:solidFill>
-                <a:schemeClr val="tx1"/>
-              </a:solidFill>
-              <a:latin typeface="+mn-lt"/>
-              <a:ea typeface="+mn-ea"/>
-              <a:cs typeface="+mn-cs"/>
-            </a:endParaRPr>
-          </a:p>
-          <a:p>
-            <a:r>
-              <a:rPr lang="en-US" sz="1200" b="0" i="0" u="none" strike="noStrike" kern="1200" baseline="0" dirty="0">
-                <a:solidFill>
-                  <a:schemeClr val="tx1"/>
-                </a:solidFill>
-                <a:latin typeface="+mn-lt"/>
-                <a:ea typeface="+mn-ea"/>
-                <a:cs typeface="+mn-cs"/>
-              </a:rPr>
-              <a:t>Acknowledge out-of-scope items. Help people set these concerns aside for later and focus back on the topic at hand. </a:t>
-            </a:r>
-          </a:p>
-          <a:p>
-            <a:r>
-              <a:rPr lang="en-US" sz="1200" b="1" i="0" u="none" strike="noStrike" kern="1200" baseline="0" dirty="0">
-                <a:solidFill>
-                  <a:schemeClr val="tx1"/>
-                </a:solidFill>
-                <a:latin typeface="+mn-lt"/>
-                <a:ea typeface="+mn-ea"/>
-                <a:cs typeface="+mn-cs"/>
-              </a:rPr>
-              <a:t>4. Current state</a:t>
-            </a:r>
-            <a:endParaRPr lang="en-US" sz="1200" b="0" i="0" u="none" strike="noStrike" kern="1200" baseline="0" dirty="0">
-              <a:solidFill>
-                <a:schemeClr val="tx1"/>
-              </a:solidFill>
-              <a:latin typeface="+mn-lt"/>
-              <a:ea typeface="+mn-ea"/>
-              <a:cs typeface="+mn-cs"/>
-            </a:endParaRPr>
-          </a:p>
-          <a:p>
-            <a:r>
-              <a:rPr lang="en-US" sz="1200" b="0" i="0" u="none" strike="noStrike" kern="1200" baseline="0" dirty="0">
-                <a:solidFill>
-                  <a:schemeClr val="tx1"/>
-                </a:solidFill>
-                <a:latin typeface="+mn-lt"/>
-                <a:ea typeface="+mn-ea"/>
-                <a:cs typeface="+mn-cs"/>
-              </a:rPr>
-              <a:t>Diagram the current state and ownership in black. The customer may help diagram this on the whiteboard. Be careful with technical depth. Focus on the system details that affect the ADS outcomes.</a:t>
-            </a:r>
-          </a:p>
-          <a:p>
-            <a:r>
-              <a:rPr lang="en-US" sz="1200" b="1" i="0" u="none" strike="noStrike" kern="1200" baseline="0" dirty="0">
-                <a:solidFill>
-                  <a:schemeClr val="tx1"/>
-                </a:solidFill>
-                <a:latin typeface="+mn-lt"/>
-                <a:ea typeface="+mn-ea"/>
-                <a:cs typeface="+mn-cs"/>
-              </a:rPr>
-              <a:t>5. Future vision</a:t>
-            </a:r>
-            <a:endParaRPr lang="en-US" sz="1200" b="0" i="0" u="none" strike="noStrike" kern="1200" baseline="0" dirty="0">
-              <a:solidFill>
-                <a:schemeClr val="tx1"/>
-              </a:solidFill>
-              <a:latin typeface="+mn-lt"/>
-              <a:ea typeface="+mn-ea"/>
-              <a:cs typeface="+mn-cs"/>
-            </a:endParaRPr>
-          </a:p>
-          <a:p>
-            <a:r>
-              <a:rPr lang="en-US" sz="1200" b="0" i="0" u="none" strike="noStrike" kern="1200" baseline="0" dirty="0">
-                <a:solidFill>
-                  <a:schemeClr val="tx1"/>
-                </a:solidFill>
-                <a:latin typeface="+mn-lt"/>
-                <a:ea typeface="+mn-ea"/>
-                <a:cs typeface="+mn-cs"/>
-              </a:rPr>
-              <a:t>Capture a high-level view of what the customer really wants in green before diving into technologies. Help customers envision the potential opportunities with Microsoft technologies. </a:t>
-            </a:r>
-          </a:p>
-          <a:p>
-            <a:r>
-              <a:rPr lang="en-US" sz="1200" b="1" i="0" u="none" strike="noStrike" kern="1200" baseline="0" dirty="0">
-                <a:solidFill>
-                  <a:schemeClr val="tx1"/>
-                </a:solidFill>
-                <a:latin typeface="+mn-lt"/>
-                <a:ea typeface="+mn-ea"/>
-                <a:cs typeface="+mn-cs"/>
-              </a:rPr>
-              <a:t>6. Implementation plan</a:t>
-            </a:r>
-            <a:endParaRPr lang="en-US" sz="1200" b="0" i="0" u="none" strike="noStrike" kern="1200" baseline="0" dirty="0">
-              <a:solidFill>
-                <a:schemeClr val="tx1"/>
-              </a:solidFill>
-              <a:latin typeface="+mn-lt"/>
-              <a:ea typeface="+mn-ea"/>
-              <a:cs typeface="+mn-cs"/>
-            </a:endParaRPr>
-          </a:p>
-          <a:p>
-            <a:r>
-              <a:rPr lang="en-US" sz="1200" b="0" i="0" u="none" strike="noStrike" kern="1200" baseline="0" dirty="0">
-                <a:solidFill>
-                  <a:schemeClr val="tx1"/>
-                </a:solidFill>
-                <a:latin typeface="+mn-lt"/>
-                <a:ea typeface="+mn-ea"/>
-                <a:cs typeface="+mn-cs"/>
-              </a:rPr>
-              <a:t>Break the plan into clear steps so the customer can track the project schedule and budget flexibility. </a:t>
-            </a:r>
-          </a:p>
-          <a:p>
-            <a:r>
-              <a:rPr lang="en-US" sz="1200" b="1" i="0" u="none" strike="noStrike" kern="1200" baseline="0" dirty="0">
-                <a:solidFill>
-                  <a:schemeClr val="tx1"/>
-                </a:solidFill>
-                <a:latin typeface="+mn-lt"/>
-                <a:ea typeface="+mn-ea"/>
-                <a:cs typeface="+mn-cs"/>
-              </a:rPr>
-              <a:t>7. Next steps</a:t>
-            </a:r>
-            <a:endParaRPr lang="en-US" sz="1200" b="0" i="0" u="none" strike="noStrike" kern="1200" baseline="0" dirty="0">
-              <a:solidFill>
-                <a:schemeClr val="tx1"/>
-              </a:solidFill>
-              <a:latin typeface="+mn-lt"/>
-              <a:ea typeface="+mn-ea"/>
-              <a:cs typeface="+mn-cs"/>
-            </a:endParaRPr>
-          </a:p>
-          <a:p>
-            <a:r>
-              <a:rPr lang="en-US" sz="1200" b="0" i="0" u="none" strike="noStrike" kern="1200" baseline="0" dirty="0">
-                <a:solidFill>
-                  <a:schemeClr val="tx1"/>
-                </a:solidFill>
-                <a:latin typeface="+mn-lt"/>
-                <a:ea typeface="+mn-ea"/>
-                <a:cs typeface="+mn-cs"/>
-              </a:rPr>
-              <a:t>Assign immediate action items during the meeting.</a:t>
-            </a:r>
-          </a:p>
-          <a:p>
-            <a:r>
-              <a:rPr lang="en-US" sz="1200" b="1" i="0" u="none" strike="noStrike" kern="1200" baseline="0" dirty="0">
-                <a:solidFill>
-                  <a:schemeClr val="tx1"/>
-                </a:solidFill>
-                <a:latin typeface="+mn-lt"/>
-                <a:ea typeface="+mn-ea"/>
-                <a:cs typeface="+mn-cs"/>
-              </a:rPr>
-              <a:t>8. Wrap-up</a:t>
-            </a:r>
-            <a:endParaRPr lang="en-US" sz="1200" b="0" i="0" u="none" strike="noStrike" kern="1200" baseline="0" dirty="0">
-              <a:solidFill>
-                <a:schemeClr val="tx1"/>
-              </a:solidFill>
-              <a:latin typeface="+mn-lt"/>
-              <a:ea typeface="+mn-ea"/>
-              <a:cs typeface="+mn-cs"/>
-            </a:endParaRPr>
-          </a:p>
-          <a:p>
-            <a:r>
-              <a:rPr lang="en-US" sz="1200" b="0" i="0" u="none" strike="noStrike" kern="1200" baseline="0" dirty="0">
-                <a:solidFill>
-                  <a:schemeClr val="tx1"/>
-                </a:solidFill>
-                <a:latin typeface="+mn-lt"/>
-                <a:ea typeface="+mn-ea"/>
-                <a:cs typeface="+mn-cs"/>
-              </a:rPr>
-              <a:t>Verify with all stakeholders that their requirements and concerns have been sufficiently addressed with the solution and plan. Close with agreement on the next steps. </a:t>
-            </a:r>
             <a:endParaRPr lang="en-US" dirty="0"/>
           </a:p>
         </p:txBody>
@@ -4753,7 +3986,7 @@
           <a:bodyPr/>
           <a:lstStyle/>
           <a:p>
-            <a:fld id="{0998D5BB-B127-481F-BC0A-2F77C576BB34}" type="slidenum">
+            <a:fld id="{D9EB630B-BF71-A34E-9F10-CD6A3DB979CB}" type="slidenum">
               <a:rPr lang="en-US" smtClean="0"/>
               <a:t>12</a:t>
             </a:fld>
@@ -4764,7 +3997,7 @@
     </p:spTree>
     <p:extLst>
       <p:ext uri="{BB962C8B-B14F-4D97-AF65-F5344CB8AC3E}">
-        <p14:creationId xmlns:p14="http://schemas.microsoft.com/office/powerpoint/2010/main" val="4249229375"/>
+        <p14:creationId xmlns:p14="http://schemas.microsoft.com/office/powerpoint/2010/main" val="2013210725"/>
       </p:ext>
     </p:extLst>
   </p:cSld>
@@ -4848,7 +4081,7 @@
     </p:spTree>
     <p:extLst>
       <p:ext uri="{BB962C8B-B14F-4D97-AF65-F5344CB8AC3E}">
-        <p14:creationId xmlns:p14="http://schemas.microsoft.com/office/powerpoint/2010/main" val="2013210725"/>
+        <p14:creationId xmlns:p14="http://schemas.microsoft.com/office/powerpoint/2010/main" val="3998528989"/>
       </p:ext>
     </p:extLst>
   </p:cSld>
@@ -4932,7 +4165,7 @@
     </p:spTree>
     <p:extLst>
       <p:ext uri="{BB962C8B-B14F-4D97-AF65-F5344CB8AC3E}">
-        <p14:creationId xmlns:p14="http://schemas.microsoft.com/office/powerpoint/2010/main" val="3998528989"/>
+        <p14:creationId xmlns:p14="http://schemas.microsoft.com/office/powerpoint/2010/main" val="3188956436"/>
       </p:ext>
     </p:extLst>
   </p:cSld>
@@ -5006,17 +4239,26 @@
           <a:lstStyle/>
           <a:p>
             <a:fld id="{D9EB630B-BF71-A34E-9F10-CD6A3DB979CB}" type="slidenum">
-              <a:rPr lang="en-US" smtClean="0"/>
+              <a:rPr lang="en-US" smtClean="0">
+                <a:solidFill>
+                  <a:prstClr val="black"/>
+                </a:solidFill>
+              </a:rPr>
+              <a:pPr/>
               <a:t>15</a:t>
             </a:fld>
-            <a:endParaRPr lang="en-US"/>
+            <a:endParaRPr lang="en-US">
+              <a:solidFill>
+                <a:prstClr val="black"/>
+              </a:solidFill>
+            </a:endParaRPr>
           </a:p>
         </p:txBody>
       </p:sp>
     </p:spTree>
     <p:extLst>
       <p:ext uri="{BB962C8B-B14F-4D97-AF65-F5344CB8AC3E}">
-        <p14:creationId xmlns:p14="http://schemas.microsoft.com/office/powerpoint/2010/main" val="3188956436"/>
+        <p14:creationId xmlns:p14="http://schemas.microsoft.com/office/powerpoint/2010/main" val="1322161564"/>
       </p:ext>
     </p:extLst>
   </p:cSld>
@@ -5090,26 +4332,17 @@
           <a:lstStyle/>
           <a:p>
             <a:fld id="{D9EB630B-BF71-A34E-9F10-CD6A3DB979CB}" type="slidenum">
-              <a:rPr lang="en-US" smtClean="0">
-                <a:solidFill>
-                  <a:prstClr val="black"/>
-                </a:solidFill>
-              </a:rPr>
-              <a:pPr/>
-              <a:t>16</a:t>
+              <a:rPr lang="en-US" smtClean="0"/>
+              <a:t>18</a:t>
             </a:fld>
-            <a:endParaRPr lang="en-US">
-              <a:solidFill>
-                <a:prstClr val="black"/>
-              </a:solidFill>
-            </a:endParaRPr>
+            <a:endParaRPr lang="en-US"/>
           </a:p>
         </p:txBody>
       </p:sp>
     </p:spTree>
     <p:extLst>
       <p:ext uri="{BB962C8B-B14F-4D97-AF65-F5344CB8AC3E}">
-        <p14:creationId xmlns:p14="http://schemas.microsoft.com/office/powerpoint/2010/main" val="1322161564"/>
+        <p14:creationId xmlns:p14="http://schemas.microsoft.com/office/powerpoint/2010/main" val="704830805"/>
       </p:ext>
     </p:extLst>
   </p:cSld>
@@ -17460,183 +16693,6 @@
       </p:grpSpPr>
       <p:sp>
         <p:nvSpPr>
-          <p:cNvPr id="3" name="Title 2">
-            <a:extLst>
-              <a:ext uri="{FF2B5EF4-FFF2-40B4-BE49-F238E27FC236}">
-                <a16:creationId xmlns:a16="http://schemas.microsoft.com/office/drawing/2014/main" id="{66CB3259-8CDD-43E7-9D75-4356C30BD1DA}"/>
-              </a:ext>
-            </a:extLst>
-          </p:cNvPr>
-          <p:cNvSpPr>
-            <a:spLocks noGrp="1"/>
-          </p:cNvSpPr>
-          <p:nvPr>
-            <p:ph type="title"/>
-          </p:nvPr>
-        </p:nvSpPr>
-        <p:spPr/>
-        <p:txBody>
-          <a:bodyPr/>
-          <a:lstStyle/>
-          <a:p>
-            <a:r>
-              <a:rPr lang="en-US" dirty="0"/>
-              <a:t>Best practice whiteboard layout</a:t>
-            </a:r>
-          </a:p>
-        </p:txBody>
-      </p:sp>
-      <p:pic>
-        <p:nvPicPr>
-          <p:cNvPr id="4" name="Picture 3">
-            <a:extLst>
-              <a:ext uri="{FF2B5EF4-FFF2-40B4-BE49-F238E27FC236}">
-                <a16:creationId xmlns:a16="http://schemas.microsoft.com/office/drawing/2014/main" id="{E690DC31-4E17-41F5-8D2F-F4EC8EBF9888}"/>
-              </a:ext>
-            </a:extLst>
-          </p:cNvPr>
-          <p:cNvPicPr>
-            <a:picLocks noChangeAspect="1"/>
-          </p:cNvPicPr>
-          <p:nvPr/>
-        </p:nvPicPr>
-        <p:blipFill>
-          <a:blip r:embed="rId3"/>
-          <a:stretch>
-            <a:fillRect/>
-          </a:stretch>
-        </p:blipFill>
-        <p:spPr>
-          <a:xfrm>
-            <a:off x="980501" y="1294941"/>
-            <a:ext cx="10230998" cy="4762268"/>
-          </a:xfrm>
-          <a:prstGeom prst="rect">
-            <a:avLst/>
-          </a:prstGeom>
-        </p:spPr>
-      </p:pic>
-      <p:sp>
-        <p:nvSpPr>
-          <p:cNvPr id="5" name="TextBox 4">
-            <a:extLst>
-              <a:ext uri="{FF2B5EF4-FFF2-40B4-BE49-F238E27FC236}">
-                <a16:creationId xmlns:a16="http://schemas.microsoft.com/office/drawing/2014/main" id="{A58329A9-AF26-461B-9B71-82EF5ED29736}"/>
-              </a:ext>
-            </a:extLst>
-          </p:cNvPr>
-          <p:cNvSpPr txBox="1"/>
-          <p:nvPr/>
-        </p:nvSpPr>
-        <p:spPr>
-          <a:xfrm>
-            <a:off x="980501" y="6057209"/>
-            <a:ext cx="10230998" cy="794064"/>
-          </a:xfrm>
-          <a:prstGeom prst="rect">
-            <a:avLst/>
-          </a:prstGeom>
-          <a:noFill/>
-        </p:spPr>
-        <p:txBody>
-          <a:bodyPr wrap="square" lIns="182880" tIns="146304" rIns="182880" bIns="146304" rtlCol="0">
-            <a:spAutoFit/>
-          </a:bodyPr>
-          <a:lstStyle/>
-          <a:p>
-            <a:pPr>
-              <a:lnSpc>
-                <a:spcPct val="90000"/>
-              </a:lnSpc>
-              <a:spcAft>
-                <a:spcPts val="600"/>
-              </a:spcAft>
-            </a:pPr>
-            <a:r>
-              <a:rPr lang="en-US" dirty="0">
-                <a:gradFill>
-                  <a:gsLst>
-                    <a:gs pos="2917">
-                      <a:schemeClr val="tx1"/>
-                    </a:gs>
-                    <a:gs pos="30000">
-                      <a:schemeClr val="tx1"/>
-                    </a:gs>
-                  </a:gsLst>
-                  <a:lin ang="5400000" scaled="0"/>
-                </a:gradFill>
-              </a:rPr>
-              <a:t>1. Project Goal | 2. Requirements &amp; concerns | 3. Parking lot | 4. Current State | 5. Future Vision | </a:t>
-            </a:r>
-            <a:br>
-              <a:rPr lang="en-US" dirty="0">
-                <a:gradFill>
-                  <a:gsLst>
-                    <a:gs pos="2917">
-                      <a:schemeClr val="tx1"/>
-                    </a:gs>
-                    <a:gs pos="30000">
-                      <a:schemeClr val="tx1"/>
-                    </a:gs>
-                  </a:gsLst>
-                  <a:lin ang="5400000" scaled="0"/>
-                </a:gradFill>
-              </a:rPr>
-            </a:br>
-            <a:r>
-              <a:rPr lang="en-US" dirty="0">
-                <a:gradFill>
-                  <a:gsLst>
-                    <a:gs pos="2917">
-                      <a:schemeClr val="tx1"/>
-                    </a:gs>
-                    <a:gs pos="30000">
-                      <a:schemeClr val="tx1"/>
-                    </a:gs>
-                  </a:gsLst>
-                  <a:lin ang="5400000" scaled="0"/>
-                </a:gradFill>
-              </a:rPr>
-              <a:t>6. Implementation plan | 7. Next steps | 8. Wrap-up</a:t>
-            </a:r>
-          </a:p>
-        </p:txBody>
-      </p:sp>
-    </p:spTree>
-    <p:extLst>
-      <p:ext uri="{BB962C8B-B14F-4D97-AF65-F5344CB8AC3E}">
-        <p14:creationId xmlns:p14="http://schemas.microsoft.com/office/powerpoint/2010/main" val="2966029408"/>
-      </p:ext>
-    </p:extLst>
-  </p:cSld>
-  <p:clrMapOvr>
-    <a:masterClrMapping/>
-  </p:clrMapOvr>
-  <p:transition>
-    <p:fade/>
-  </p:transition>
-</p:sld>
-</file>
-
-<file path=ppt/slides/slide13.xml><?xml version="1.0" encoding="utf-8"?>
-<p:sld xmlns:a="http://schemas.openxmlformats.org/drawingml/2006/main" xmlns:r="http://schemas.openxmlformats.org/officeDocument/2006/relationships" xmlns:p="http://schemas.openxmlformats.org/presentationml/2006/main">
-  <p:cSld>
-    <p:spTree>
-      <p:nvGrpSpPr>
-        <p:cNvPr id="1" name=""/>
-        <p:cNvGrpSpPr/>
-        <p:nvPr/>
-      </p:nvGrpSpPr>
-      <p:grpSpPr>
-        <a:xfrm>
-          <a:off x="0" y="0"/>
-          <a:ext cx="0" cy="0"/>
-          <a:chOff x="0" y="0"/>
-          <a:chExt cx="0" cy="0"/>
-        </a:xfrm>
-      </p:grpSpPr>
-      <p:sp>
-        <p:nvSpPr>
           <p:cNvPr id="2" name="Title 1"/>
           <p:cNvSpPr>
             <a:spLocks noGrp="1"/>
@@ -17940,7 +16996,7 @@
 </p:sld>
 </file>
 
-<file path=ppt/slides/slide14.xml><?xml version="1.0" encoding="utf-8"?>
+<file path=ppt/slides/slide13.xml><?xml version="1.0" encoding="utf-8"?>
 <p:sld xmlns:a="http://schemas.openxmlformats.org/drawingml/2006/main" xmlns:r="http://schemas.openxmlformats.org/officeDocument/2006/relationships" xmlns:p="http://schemas.openxmlformats.org/presentationml/2006/main">
   <p:cSld>
     <p:spTree>
@@ -18272,7 +17328,7 @@
 </p:sld>
 </file>
 
-<file path=ppt/slides/slide15.xml><?xml version="1.0" encoding="utf-8"?>
+<file path=ppt/slides/slide14.xml><?xml version="1.0" encoding="utf-8"?>
 <p:sld xmlns:a="http://schemas.openxmlformats.org/drawingml/2006/main" xmlns:r="http://schemas.openxmlformats.org/officeDocument/2006/relationships" xmlns:p="http://schemas.openxmlformats.org/presentationml/2006/main">
   <p:cSld>
     <p:spTree>
@@ -18642,7 +17698,7 @@
 </p:sld>
 </file>
 
-<file path=ppt/slides/slide16.xml><?xml version="1.0" encoding="utf-8"?>
+<file path=ppt/slides/slide15.xml><?xml version="1.0" encoding="utf-8"?>
 <p:sld xmlns:a="http://schemas.openxmlformats.org/drawingml/2006/main" xmlns:r="http://schemas.openxmlformats.org/officeDocument/2006/relationships" xmlns:p="http://schemas.openxmlformats.org/presentationml/2006/main">
   <p:cSld>
     <p:spTree>
@@ -20195,7 +19251,7 @@
 </p:sld>
 </file>
 
-<file path=ppt/slides/slide17.xml><?xml version="1.0" encoding="utf-8"?>
+<file path=ppt/slides/slide16.xml><?xml version="1.0" encoding="utf-8"?>
 <p:sld xmlns:a="http://schemas.openxmlformats.org/drawingml/2006/main" xmlns:r="http://schemas.openxmlformats.org/officeDocument/2006/relationships" xmlns:p="http://schemas.openxmlformats.org/presentationml/2006/main">
   <p:cSld>
     <p:spTree>
@@ -20319,7 +19375,7 @@
 </p:sld>
 </file>
 
-<file path=ppt/slides/slide18.xml><?xml version="1.0" encoding="utf-8"?>
+<file path=ppt/slides/slide17.xml><?xml version="1.0" encoding="utf-8"?>
 <p:sld xmlns:a="http://schemas.openxmlformats.org/drawingml/2006/main" xmlns:r="http://schemas.openxmlformats.org/officeDocument/2006/relationships" xmlns:p="http://schemas.openxmlformats.org/presentationml/2006/main">
   <p:cSld>
     <p:spTree>
@@ -20455,7 +19511,7 @@
 </p:sld>
 </file>
 
-<file path=ppt/slides/slide19.xml><?xml version="1.0" encoding="utf-8"?>
+<file path=ppt/slides/slide18.xml><?xml version="1.0" encoding="utf-8"?>
 <p:sld xmlns:a="http://schemas.openxmlformats.org/drawingml/2006/main" xmlns:r="http://schemas.openxmlformats.org/officeDocument/2006/relationships" xmlns:p="http://schemas.openxmlformats.org/presentationml/2006/main">
   <p:cSld>
     <p:spTree>
@@ -20717,146 +19773,7 @@
 </p:sld>
 </file>
 
-<file path=ppt/slides/slide2.xml><?xml version="1.0" encoding="utf-8"?>
-<p:sld xmlns:a="http://schemas.openxmlformats.org/drawingml/2006/main" xmlns:r="http://schemas.openxmlformats.org/officeDocument/2006/relationships" xmlns:p="http://schemas.openxmlformats.org/presentationml/2006/main">
-  <p:cSld>
-    <p:bg>
-      <p:bgPr>
-        <a:solidFill>
-          <a:schemeClr val="bg2"/>
-        </a:solidFill>
-        <a:effectLst/>
-      </p:bgPr>
-    </p:bg>
-    <p:spTree>
-      <p:nvGrpSpPr>
-        <p:cNvPr id="1" name=""/>
-        <p:cNvGrpSpPr/>
-        <p:nvPr/>
-      </p:nvGrpSpPr>
-      <p:grpSpPr>
-        <a:xfrm>
-          <a:off x="0" y="0"/>
-          <a:ext cx="0" cy="0"/>
-          <a:chOff x="0" y="0"/>
-          <a:chExt cx="0" cy="0"/>
-        </a:xfrm>
-      </p:grpSpPr>
-      <p:sp>
-        <p:nvSpPr>
-          <p:cNvPr id="2" name="Title 1"/>
-          <p:cNvSpPr>
-            <a:spLocks noGrp="1"/>
-          </p:cNvSpPr>
-          <p:nvPr>
-            <p:ph type="title"/>
-          </p:nvPr>
-        </p:nvSpPr>
-        <p:spPr/>
-        <p:txBody>
-          <a:bodyPr>
-            <a:normAutofit/>
-          </a:bodyPr>
-          <a:lstStyle/>
-          <a:p>
-            <a:r>
-              <a:rPr lang="en-US" sz="4400" dirty="0">
-                <a:solidFill>
-                  <a:schemeClr val="tx1"/>
-                </a:solidFill>
-                <a:latin typeface="Segoe UI Light" panose="020B0502040204020203" pitchFamily="34" charset="0"/>
-                <a:cs typeface="Segoe UI Light" panose="020B0502040204020203" pitchFamily="34" charset="0"/>
-              </a:rPr>
-              <a:t>Abstract and learning objectives</a:t>
-            </a:r>
-          </a:p>
-        </p:txBody>
-      </p:sp>
-      <p:sp>
-        <p:nvSpPr>
-          <p:cNvPr id="9" name="TextBox 8">
-            <a:extLst>
-              <a:ext uri="{FF2B5EF4-FFF2-40B4-BE49-F238E27FC236}">
-                <a16:creationId xmlns:a16="http://schemas.microsoft.com/office/drawing/2014/main" id="{0F86F9F9-39B5-4CE6-AF48-9ADAE40EA728}"/>
-              </a:ext>
-            </a:extLst>
-          </p:cNvPr>
-          <p:cNvSpPr txBox="1"/>
-          <p:nvPr/>
-        </p:nvSpPr>
-        <p:spPr>
-          <a:xfrm>
-            <a:off x="340285" y="1741246"/>
-            <a:ext cx="7247965" cy="1868204"/>
-          </a:xfrm>
-          <a:prstGeom prst="rect">
-            <a:avLst/>
-          </a:prstGeom>
-          <a:noFill/>
-        </p:spPr>
-        <p:txBody>
-          <a:bodyPr wrap="square" lIns="182880" tIns="146304" rIns="182880" bIns="146304" rtlCol="0">
-            <a:spAutoFit/>
-          </a:bodyPr>
-          <a:lstStyle/>
-          <a:p>
-            <a:pPr>
-              <a:lnSpc>
-                <a:spcPct val="90000"/>
-              </a:lnSpc>
-              <a:spcAft>
-                <a:spcPts val="600"/>
-              </a:spcAft>
-            </a:pPr>
-            <a:r>
-              <a:rPr lang="en-US" sz="3600" dirty="0">
-                <a:latin typeface="+mj-lt"/>
-              </a:rPr>
-              <a:t>Abstract and learning objectives</a:t>
-            </a:r>
-          </a:p>
-          <a:p>
-            <a:pPr>
-              <a:lnSpc>
-                <a:spcPct val="90000"/>
-              </a:lnSpc>
-              <a:spcAft>
-                <a:spcPts val="600"/>
-              </a:spcAft>
-            </a:pPr>
-            <a:r>
-              <a:rPr lang="en-US" sz="2400" dirty="0">
-                <a:latin typeface="Segoe UI Semilight" panose="020B0402040204020203" pitchFamily="34" charset="0"/>
-                <a:cs typeface="Segoe UI Semilight" panose="020B0402040204020203" pitchFamily="34" charset="0"/>
-              </a:rPr>
-              <a:t>Facilitate discussion around top ADS tips &amp; tricks, leading to presentation on what makes a great ADS from requirements collection to architecture. </a:t>
-            </a:r>
-            <a:endParaRPr lang="en-US" sz="2400" dirty="0"/>
-          </a:p>
-        </p:txBody>
-      </p:sp>
-    </p:spTree>
-    <p:extLst>
-      <p:ext uri="{BB962C8B-B14F-4D97-AF65-F5344CB8AC3E}">
-        <p14:creationId xmlns:p14="http://schemas.microsoft.com/office/powerpoint/2010/main" val="772880493"/>
-      </p:ext>
-    </p:extLst>
-  </p:cSld>
-  <p:clrMapOvr>
-    <a:masterClrMapping/>
-  </p:clrMapOvr>
-  <mc:AlternateContent xmlns:mc="http://schemas.openxmlformats.org/markup-compatibility/2006" xmlns:p14="http://schemas.microsoft.com/office/powerpoint/2010/main">
-    <mc:Choice Requires="p14">
-      <p:transition p14:dur="0"/>
-    </mc:Choice>
-    <mc:Fallback xmlns="">
-      <p:transition/>
-    </mc:Fallback>
-  </mc:AlternateContent>
-</p:sld>
-</file>
-
-<file path=ppt/slides/slide20.xml><?xml version="1.0" encoding="utf-8"?>
+<file path=ppt/slides/slide19.xml><?xml version="1.0" encoding="utf-8"?>
 <p:sld xmlns:a="http://schemas.openxmlformats.org/drawingml/2006/main" xmlns:r="http://schemas.openxmlformats.org/officeDocument/2006/relationships" xmlns:p="http://schemas.openxmlformats.org/presentationml/2006/main">
   <p:cSld>
     <p:spTree>
@@ -20980,69 +19897,17 @@
 </p:sld>
 </file>
 
-<file path=ppt/slides/slide21.xml><?xml version="1.0" encoding="utf-8"?>
+<file path=ppt/slides/slide2.xml><?xml version="1.0" encoding="utf-8"?>
 <p:sld xmlns:a="http://schemas.openxmlformats.org/drawingml/2006/main" xmlns:r="http://schemas.openxmlformats.org/officeDocument/2006/relationships" xmlns:p="http://schemas.openxmlformats.org/presentationml/2006/main">
   <p:cSld>
-    <p:spTree>
-      <p:nvGrpSpPr>
-        <p:cNvPr id="1" name=""/>
-        <p:cNvGrpSpPr/>
-        <p:nvPr/>
-      </p:nvGrpSpPr>
-      <p:grpSpPr>
-        <a:xfrm>
-          <a:off x="0" y="0"/>
-          <a:ext cx="0" cy="0"/>
-          <a:chOff x="0" y="0"/>
-          <a:chExt cx="0" cy="0"/>
-        </a:xfrm>
-      </p:grpSpPr>
-      <p:sp>
-        <p:nvSpPr>
-          <p:cNvPr id="3" name="Title 2"/>
-          <p:cNvSpPr>
-            <a:spLocks noGrp="1"/>
-          </p:cNvSpPr>
-          <p:nvPr>
-            <p:ph type="title"/>
-          </p:nvPr>
-        </p:nvSpPr>
-        <p:spPr>
-          <a:xfrm>
-            <a:off x="0" y="2083486"/>
-            <a:ext cx="12161837" cy="2691028"/>
-          </a:xfrm>
-        </p:spPr>
-        <p:txBody>
-          <a:bodyPr lIns="457200"/>
-          <a:lstStyle/>
-          <a:p>
-            <a:r>
-              <a:rPr lang="en-US" sz="8000" dirty="0"/>
-              <a:t>How to structure and execute a POC / prototype</a:t>
-            </a:r>
-          </a:p>
-        </p:txBody>
-      </p:sp>
-    </p:spTree>
-    <p:extLst>
-      <p:ext uri="{BB962C8B-B14F-4D97-AF65-F5344CB8AC3E}">
-        <p14:creationId xmlns:p14="http://schemas.microsoft.com/office/powerpoint/2010/main" val="3920936324"/>
-      </p:ext>
-    </p:extLst>
-  </p:cSld>
-  <p:clrMapOvr>
-    <a:masterClrMapping/>
-  </p:clrMapOvr>
-  <p:transition>
-    <p:fade/>
-  </p:transition>
-</p:sld>
-</file>
-
-<file path=ppt/slides/slide22.xml><?xml version="1.0" encoding="utf-8"?>
-<p:sld xmlns:a="http://schemas.openxmlformats.org/drawingml/2006/main" xmlns:r="http://schemas.openxmlformats.org/officeDocument/2006/relationships" xmlns:p="http://schemas.openxmlformats.org/presentationml/2006/main">
-  <p:cSld>
+    <p:bg>
+      <p:bgPr>
+        <a:solidFill>
+          <a:schemeClr val="bg2"/>
+        </a:solidFill>
+        <a:effectLst/>
+      </p:bgPr>
+    </p:bg>
     <p:spTree>
       <p:nvGrpSpPr>
         <p:cNvPr id="1" name=""/>
@@ -21069,27 +19934,40 @@
         </p:nvSpPr>
         <p:spPr/>
         <p:txBody>
-          <a:bodyPr/>
+          <a:bodyPr>
+            <a:normAutofit/>
+          </a:bodyPr>
           <a:lstStyle/>
           <a:p>
             <a:r>
-              <a:rPr lang="en-US"/>
-              <a:t>Benefits of creating a POC</a:t>
-            </a:r>
-            <a:endParaRPr lang="en-US" dirty="0"/>
+              <a:rPr lang="en-US" sz="4400" dirty="0">
+                <a:solidFill>
+                  <a:schemeClr val="tx1"/>
+                </a:solidFill>
+                <a:latin typeface="Segoe UI Light" panose="020B0502040204020203" pitchFamily="34" charset="0"/>
+                <a:cs typeface="Segoe UI Light" panose="020B0502040204020203" pitchFamily="34" charset="0"/>
+              </a:rPr>
+              <a:t>Abstract and learning objectives</a:t>
+            </a:r>
           </a:p>
         </p:txBody>
       </p:sp>
       <p:sp>
         <p:nvSpPr>
-          <p:cNvPr id="11" name="TextBox 10"/>
+          <p:cNvPr id="9" name="TextBox 8">
+            <a:extLst>
+              <a:ext uri="{FF2B5EF4-FFF2-40B4-BE49-F238E27FC236}">
+                <a16:creationId xmlns:a16="http://schemas.microsoft.com/office/drawing/2014/main" id="{0F86F9F9-39B5-4CE6-AF48-9ADAE40EA728}"/>
+              </a:ext>
+            </a:extLst>
+          </p:cNvPr>
           <p:cNvSpPr txBox="1"/>
           <p:nvPr/>
         </p:nvSpPr>
         <p:spPr>
           <a:xfrm>
-            <a:off x="1768243" y="1382038"/>
-            <a:ext cx="9851570" cy="2040559"/>
+            <a:off x="340285" y="1741246"/>
+            <a:ext cx="7247965" cy="1868204"/>
           </a:xfrm>
           <a:prstGeom prst="rect">
             <a:avLst/>
@@ -21111,35 +19989,12 @@
               </a:spcAft>
             </a:pPr>
             <a:r>
-              <a:rPr lang="en-US" dirty="0">
+              <a:rPr lang="en-US" sz="3600" dirty="0">
                 <a:latin typeface="+mj-lt"/>
               </a:rPr>
-              <a:t>A proof of concept is meant to overcome customer objections by demonstrating the solution will solve the problem for which it is designed. Treat a POC as a continuous learning and improvement process for the solution. A rapid execution tempo of the POC helps validate the customer’s requirements, while giving them confidence in your ability to deliver on your promises. A successful POC can serve as evidence that your practice can use for future engagements with your customer or new ones. In fact, many times the output of a POC can be added to your practice’s intellectual property list for demonstrations, or used to accelerate future solutions.</a:t>
-            </a:r>
-          </a:p>
-        </p:txBody>
-      </p:sp>
-      <p:sp>
-        <p:nvSpPr>
-          <p:cNvPr id="15" name="TextBox 14"/>
-          <p:cNvSpPr txBox="1"/>
-          <p:nvPr/>
-        </p:nvSpPr>
-        <p:spPr>
-          <a:xfrm>
-            <a:off x="1768243" y="3411777"/>
-            <a:ext cx="7475911" cy="544765"/>
-          </a:xfrm>
-          <a:prstGeom prst="rect">
-            <a:avLst/>
-          </a:prstGeom>
-          <a:noFill/>
-        </p:spPr>
-        <p:txBody>
-          <a:bodyPr wrap="square" lIns="182880" tIns="146304" rIns="182880" bIns="146304" rtlCol="0">
-            <a:spAutoFit/>
-          </a:bodyPr>
-          <a:lstStyle/>
+              <a:t>Abstract and learning objectives</a:t>
+            </a:r>
+          </a:p>
           <a:p>
             <a:pPr>
               <a:lnSpc>
@@ -21150,182 +20005,20 @@
               </a:spcAft>
             </a:pPr>
             <a:r>
-              <a:rPr lang="en-US" dirty="0">
-                <a:latin typeface="+mj-lt"/>
+              <a:rPr lang="en-US" sz="2400" dirty="0">
+                <a:latin typeface="Segoe UI Semilight" panose="020B0402040204020203" pitchFamily="34" charset="0"/>
+                <a:cs typeface="Segoe UI Semilight" panose="020B0402040204020203" pitchFamily="34" charset="0"/>
               </a:rPr>
-              <a:t>A typical POC undergoes the following phases:</a:t>
-            </a:r>
-          </a:p>
-        </p:txBody>
-      </p:sp>
-      <p:sp>
-        <p:nvSpPr>
-          <p:cNvPr id="6" name="Rectangle 5"/>
-          <p:cNvSpPr/>
-          <p:nvPr/>
-        </p:nvSpPr>
-        <p:spPr>
-          <a:xfrm>
-            <a:off x="2130572" y="4115670"/>
-            <a:ext cx="6096000" cy="1243417"/>
-          </a:xfrm>
-          <a:prstGeom prst="rect">
-            <a:avLst/>
-          </a:prstGeom>
-        </p:spPr>
-        <p:txBody>
-          <a:bodyPr>
-            <a:spAutoFit/>
-          </a:bodyPr>
-          <a:lstStyle/>
-          <a:p>
-            <a:pPr marL="285750" indent="-285750">
-              <a:lnSpc>
-                <a:spcPct val="90000"/>
-              </a:lnSpc>
-              <a:spcAft>
-                <a:spcPts val="600"/>
-              </a:spcAft>
-              <a:buFont typeface="Arial" panose="020B0604020202020204" pitchFamily="34" charset="0"/>
-              <a:buChar char="•"/>
-            </a:pPr>
-            <a:r>
-              <a:rPr lang="en-US" dirty="0"/>
-              <a:t>Define scope – scoping typically occurs during an ADS</a:t>
-            </a:r>
-          </a:p>
-          <a:p>
-            <a:pPr marL="285750" indent="-285750">
-              <a:lnSpc>
-                <a:spcPct val="90000"/>
-              </a:lnSpc>
-              <a:spcAft>
-                <a:spcPts val="600"/>
-              </a:spcAft>
-              <a:buFont typeface="Arial" panose="020B0604020202020204" pitchFamily="34" charset="0"/>
-              <a:buChar char="•"/>
-            </a:pPr>
-            <a:r>
-              <a:rPr lang="en-US" dirty="0"/>
-              <a:t>Execute implementation – create, test, refine, repeat</a:t>
-            </a:r>
-          </a:p>
-          <a:p>
-            <a:pPr marL="285750" indent="-285750">
-              <a:lnSpc>
-                <a:spcPct val="90000"/>
-              </a:lnSpc>
-              <a:spcAft>
-                <a:spcPts val="600"/>
-              </a:spcAft>
-              <a:buFont typeface="Arial" panose="020B0604020202020204" pitchFamily="34" charset="0"/>
-              <a:buChar char="•"/>
-            </a:pPr>
-            <a:r>
-              <a:rPr lang="en-US" dirty="0"/>
-              <a:t>Conclude – lessons learned, validation, production development begins</a:t>
-            </a:r>
-          </a:p>
-        </p:txBody>
-      </p:sp>
-      <p:pic>
-        <p:nvPicPr>
-          <p:cNvPr id="3" name="Picture 2"/>
-          <p:cNvPicPr>
-            <a:picLocks noChangeAspect="1"/>
-          </p:cNvPicPr>
-          <p:nvPr/>
-        </p:nvPicPr>
-        <p:blipFill>
-          <a:blip r:embed="rId3">
-            <a:duotone>
-              <a:schemeClr val="accent1">
-                <a:shade val="45000"/>
-                <a:satMod val="135000"/>
-              </a:schemeClr>
-              <a:prstClr val="white"/>
-            </a:duotone>
-            <a:extLst>
-              <a:ext uri="{BEBA8EAE-BF5A-486C-A8C5-ECC9F3942E4B}">
-                <a14:imgProps xmlns:a14="http://schemas.microsoft.com/office/drawing/2010/main">
-                  <a14:imgLayer r:embed="rId4">
-                    <a14:imgEffect>
-                      <a14:brightnessContrast bright="20000" contrast="40000"/>
-                    </a14:imgEffect>
-                  </a14:imgLayer>
-                </a14:imgProps>
-              </a:ext>
-            </a:extLst>
-          </a:blip>
-          <a:stretch>
-            <a:fillRect/>
-          </a:stretch>
-        </p:blipFill>
-        <p:spPr>
-          <a:xfrm flipH="1">
-            <a:off x="8805905" y="3587304"/>
-            <a:ext cx="2316056" cy="1771783"/>
-          </a:xfrm>
-          <a:prstGeom prst="rect">
-            <a:avLst/>
-          </a:prstGeom>
-        </p:spPr>
-      </p:pic>
-      <p:sp>
-        <p:nvSpPr>
-          <p:cNvPr id="12" name="TextBox 11"/>
-          <p:cNvSpPr txBox="1"/>
-          <p:nvPr/>
-        </p:nvSpPr>
-        <p:spPr>
-          <a:xfrm>
-            <a:off x="1768242" y="5638230"/>
-            <a:ext cx="10047674" cy="1043363"/>
-          </a:xfrm>
-          <a:prstGeom prst="rect">
-            <a:avLst/>
-          </a:prstGeom>
-          <a:noFill/>
-        </p:spPr>
-        <p:txBody>
-          <a:bodyPr wrap="square" lIns="182880" tIns="146304" rIns="182880" bIns="146304" rtlCol="0">
-            <a:spAutoFit/>
-          </a:bodyPr>
-          <a:lstStyle/>
-          <a:p>
-            <a:pPr>
-              <a:lnSpc>
-                <a:spcPct val="90000"/>
-              </a:lnSpc>
-              <a:spcAft>
-                <a:spcPts val="600"/>
-              </a:spcAft>
-            </a:pPr>
-            <a:r>
-              <a:rPr lang="en-US" dirty="0">
-                <a:latin typeface="+mj-lt"/>
-              </a:rPr>
-              <a:t>A POC is </a:t>
-            </a:r>
-            <a:r>
-              <a:rPr lang="en-US" b="1" dirty="0">
-                <a:latin typeface="+mj-lt"/>
-              </a:rPr>
-              <a:t>NOT</a:t>
-            </a:r>
-            <a:r>
-              <a:rPr lang="en-US" dirty="0">
-                <a:latin typeface="+mj-lt"/>
-              </a:rPr>
-              <a:t> meant to be used as, or modified to become, the production solution. It is meant for rapid prototyping only. A POC can also be used as a loss leader to generate sales opportunities, or effectively as a profit center.</a:t>
-            </a:r>
+              <a:t>Facilitate discussion around top ADS tips &amp; tricks, leading to presentation on what makes a great ADS from requirements collection to architecture. </a:t>
+            </a:r>
+            <a:endParaRPr lang="en-US" sz="2400" dirty="0"/>
           </a:p>
         </p:txBody>
       </p:sp>
     </p:spTree>
     <p:extLst>
       <p:ext uri="{BB962C8B-B14F-4D97-AF65-F5344CB8AC3E}">
-        <p14:creationId xmlns:p14="http://schemas.microsoft.com/office/powerpoint/2010/main" val="1480228449"/>
+        <p14:creationId xmlns:p14="http://schemas.microsoft.com/office/powerpoint/2010/main" val="772880493"/>
       </p:ext>
     </p:extLst>
   </p:cSld>
@@ -21334,793 +20027,10 @@
   </p:clrMapOvr>
   <mc:AlternateContent xmlns:mc="http://schemas.openxmlformats.org/markup-compatibility/2006" xmlns:p14="http://schemas.microsoft.com/office/powerpoint/2010/main">
     <mc:Choice Requires="p14">
-      <p:transition spd="med" p14:dur="700">
-        <p:fade/>
-      </p:transition>
+      <p:transition p14:dur="0"/>
     </mc:Choice>
     <mc:Fallback xmlns="">
-      <p:transition spd="med">
-        <p:fade/>
-      </p:transition>
-    </mc:Fallback>
-  </mc:AlternateContent>
-</p:sld>
-</file>
-
-<file path=ppt/slides/slide23.xml><?xml version="1.0" encoding="utf-8"?>
-<p:sld xmlns:a="http://schemas.openxmlformats.org/drawingml/2006/main" xmlns:r="http://schemas.openxmlformats.org/officeDocument/2006/relationships" xmlns:p="http://schemas.openxmlformats.org/presentationml/2006/main">
-  <p:cSld>
-    <p:spTree>
-      <p:nvGrpSpPr>
-        <p:cNvPr id="1" name=""/>
-        <p:cNvGrpSpPr/>
-        <p:nvPr/>
-      </p:nvGrpSpPr>
-      <p:grpSpPr>
-        <a:xfrm>
-          <a:off x="0" y="0"/>
-          <a:ext cx="0" cy="0"/>
-          <a:chOff x="0" y="0"/>
-          <a:chExt cx="0" cy="0"/>
-        </a:xfrm>
-      </p:grpSpPr>
-      <p:sp>
-        <p:nvSpPr>
-          <p:cNvPr id="2" name="Title 1"/>
-          <p:cNvSpPr>
-            <a:spLocks noGrp="1"/>
-          </p:cNvSpPr>
-          <p:nvPr>
-            <p:ph type="title"/>
-          </p:nvPr>
-        </p:nvSpPr>
-        <p:spPr/>
-        <p:txBody>
-          <a:bodyPr/>
-          <a:lstStyle/>
-          <a:p>
-            <a:r>
-              <a:rPr lang="en-US"/>
-              <a:t>Define POC Scope Checklist</a:t>
-            </a:r>
-            <a:endParaRPr lang="en-US" dirty="0"/>
-          </a:p>
-        </p:txBody>
-      </p:sp>
-      <p:sp>
-        <p:nvSpPr>
-          <p:cNvPr id="11" name="TextBox 10"/>
-          <p:cNvSpPr txBox="1"/>
-          <p:nvPr/>
-        </p:nvSpPr>
-        <p:spPr>
-          <a:xfrm>
-            <a:off x="2198194" y="1817396"/>
-            <a:ext cx="8129681" cy="1043363"/>
-          </a:xfrm>
-          <a:prstGeom prst="rect">
-            <a:avLst/>
-          </a:prstGeom>
-          <a:noFill/>
-        </p:spPr>
-        <p:txBody>
-          <a:bodyPr wrap="square" lIns="182880" tIns="146304" rIns="182880" bIns="146304" rtlCol="0">
-            <a:spAutoFit/>
-          </a:bodyPr>
-          <a:lstStyle/>
-          <a:p>
-            <a:pPr>
-              <a:lnSpc>
-                <a:spcPct val="90000"/>
-              </a:lnSpc>
-              <a:spcAft>
-                <a:spcPts val="600"/>
-              </a:spcAft>
-            </a:pPr>
-            <a:r>
-              <a:rPr lang="en-US" dirty="0">
-                <a:latin typeface="+mj-lt"/>
-              </a:rPr>
-              <a:t>Always establish a clear and concrete scope before starting work on a POC. Work with your group to review and whiteboard POC requirements based on data gathered from the ADS. Be sure to do the following:</a:t>
-            </a:r>
-          </a:p>
-        </p:txBody>
-      </p:sp>
-      <p:sp>
-        <p:nvSpPr>
-          <p:cNvPr id="6" name="Rectangle 5"/>
-          <p:cNvSpPr/>
-          <p:nvPr/>
-        </p:nvSpPr>
-        <p:spPr>
-          <a:xfrm>
-            <a:off x="2661450" y="3030026"/>
-            <a:ext cx="8494230" cy="2299091"/>
-          </a:xfrm>
-          <a:prstGeom prst="rect">
-            <a:avLst/>
-          </a:prstGeom>
-        </p:spPr>
-        <p:txBody>
-          <a:bodyPr wrap="square">
-            <a:spAutoFit/>
-          </a:bodyPr>
-          <a:lstStyle/>
-          <a:p>
-            <a:pPr marL="285750" indent="-285750">
-              <a:lnSpc>
-                <a:spcPct val="90000"/>
-              </a:lnSpc>
-              <a:spcAft>
-                <a:spcPts val="600"/>
-              </a:spcAft>
-              <a:buFont typeface="Wingdings" charset="2"/>
-              <a:buChar char="q"/>
-            </a:pPr>
-            <a:r>
-              <a:rPr lang="en-US" dirty="0"/>
-              <a:t>Go over established business and technical requirements from the ADS</a:t>
-            </a:r>
-          </a:p>
-          <a:p>
-            <a:pPr marL="285750" indent="-285750">
-              <a:lnSpc>
-                <a:spcPct val="90000"/>
-              </a:lnSpc>
-              <a:spcAft>
-                <a:spcPts val="600"/>
-              </a:spcAft>
-              <a:buFont typeface="Wingdings" charset="2"/>
-              <a:buChar char="q"/>
-            </a:pPr>
-            <a:r>
-              <a:rPr lang="en-US" dirty="0"/>
-              <a:t>Condense full set of requirements down to workloads and features of the POC</a:t>
-            </a:r>
-          </a:p>
-          <a:p>
-            <a:pPr marL="742950" lvl="1" indent="-285750">
-              <a:lnSpc>
-                <a:spcPct val="90000"/>
-              </a:lnSpc>
-              <a:spcAft>
-                <a:spcPts val="600"/>
-              </a:spcAft>
-              <a:buFont typeface="Wingdings" charset="2"/>
-              <a:buChar char="q"/>
-            </a:pPr>
-            <a:r>
-              <a:rPr lang="en-US" dirty="0"/>
-              <a:t>Select proof points and address objections to overcome</a:t>
-            </a:r>
-          </a:p>
-          <a:p>
-            <a:pPr marL="742950" lvl="1" indent="-285750">
-              <a:lnSpc>
-                <a:spcPct val="90000"/>
-              </a:lnSpc>
-              <a:spcAft>
-                <a:spcPts val="600"/>
-              </a:spcAft>
-              <a:buFont typeface="Wingdings" charset="2"/>
-              <a:buChar char="q"/>
-            </a:pPr>
-            <a:r>
-              <a:rPr lang="en-US" dirty="0"/>
-              <a:t>Be able to answer </a:t>
-            </a:r>
-            <a:r>
-              <a:rPr lang="mr-IN" dirty="0"/>
-              <a:t>–</a:t>
-            </a:r>
-            <a:r>
-              <a:rPr lang="en-US" dirty="0"/>
-              <a:t> what are you trying prove with the POC?</a:t>
-            </a:r>
-          </a:p>
-          <a:p>
-            <a:pPr marL="285750" indent="-285750">
-              <a:lnSpc>
-                <a:spcPct val="90000"/>
-              </a:lnSpc>
-              <a:spcAft>
-                <a:spcPts val="600"/>
-              </a:spcAft>
-              <a:buFont typeface="Wingdings" charset="2"/>
-              <a:buChar char="q"/>
-            </a:pPr>
-            <a:r>
-              <a:rPr lang="en-US" dirty="0"/>
-              <a:t>Establish team responsibilities and organization</a:t>
-            </a:r>
-          </a:p>
-          <a:p>
-            <a:pPr marL="285750" indent="-285750">
-              <a:lnSpc>
-                <a:spcPct val="90000"/>
-              </a:lnSpc>
-              <a:spcAft>
-                <a:spcPts val="600"/>
-              </a:spcAft>
-              <a:buFont typeface="Wingdings" charset="2"/>
-              <a:buChar char="q"/>
-            </a:pPr>
-            <a:r>
-              <a:rPr lang="en-US" dirty="0"/>
-              <a:t>Perform Azure cost estimates</a:t>
-            </a:r>
-          </a:p>
-          <a:p>
-            <a:pPr marL="285750" indent="-285750">
-              <a:lnSpc>
-                <a:spcPct val="90000"/>
-              </a:lnSpc>
-              <a:spcAft>
-                <a:spcPts val="600"/>
-              </a:spcAft>
-              <a:buFont typeface="Wingdings" charset="2"/>
-              <a:buChar char="q"/>
-            </a:pPr>
-            <a:r>
-              <a:rPr lang="en-US" dirty="0"/>
-              <a:t>Outline next steps after the success criteria is met</a:t>
-            </a:r>
-          </a:p>
-        </p:txBody>
-      </p:sp>
-      <p:pic>
-        <p:nvPicPr>
-          <p:cNvPr id="4" name="Picture 3"/>
-          <p:cNvPicPr>
-            <a:picLocks noChangeAspect="1"/>
-          </p:cNvPicPr>
-          <p:nvPr/>
-        </p:nvPicPr>
-        <p:blipFill>
-          <a:blip r:embed="rId3"/>
-          <a:stretch>
-            <a:fillRect/>
-          </a:stretch>
-        </p:blipFill>
-        <p:spPr>
-          <a:xfrm>
-            <a:off x="-139279" y="2228625"/>
-            <a:ext cx="3115422" cy="3115422"/>
-          </a:xfrm>
-          <a:prstGeom prst="rect">
-            <a:avLst/>
-          </a:prstGeom>
-        </p:spPr>
-      </p:pic>
-      <p:sp>
-        <p:nvSpPr>
-          <p:cNvPr id="10" name="TextBox 9"/>
-          <p:cNvSpPr txBox="1"/>
-          <p:nvPr/>
-        </p:nvSpPr>
-        <p:spPr>
-          <a:xfrm>
-            <a:off x="2198193" y="5344047"/>
-            <a:ext cx="8129681" cy="794064"/>
-          </a:xfrm>
-          <a:prstGeom prst="rect">
-            <a:avLst/>
-          </a:prstGeom>
-          <a:noFill/>
-        </p:spPr>
-        <p:txBody>
-          <a:bodyPr wrap="square" lIns="182880" tIns="146304" rIns="182880" bIns="146304" rtlCol="0">
-            <a:spAutoFit/>
-          </a:bodyPr>
-          <a:lstStyle/>
-          <a:p>
-            <a:pPr>
-              <a:lnSpc>
-                <a:spcPct val="90000"/>
-              </a:lnSpc>
-              <a:spcAft>
-                <a:spcPts val="600"/>
-              </a:spcAft>
-            </a:pPr>
-            <a:r>
-              <a:rPr lang="en-US" dirty="0">
-                <a:latin typeface="+mj-lt"/>
-              </a:rPr>
-              <a:t>Remember, plan your POC development strategy with speed of execution in mind, not durability and longevity. This is not to become the production solution.</a:t>
-            </a:r>
-          </a:p>
-        </p:txBody>
-      </p:sp>
-    </p:spTree>
-    <p:extLst>
-      <p:ext uri="{BB962C8B-B14F-4D97-AF65-F5344CB8AC3E}">
-        <p14:creationId xmlns:p14="http://schemas.microsoft.com/office/powerpoint/2010/main" val="3329247954"/>
-      </p:ext>
-    </p:extLst>
-  </p:cSld>
-  <p:clrMapOvr>
-    <a:masterClrMapping/>
-  </p:clrMapOvr>
-  <mc:AlternateContent xmlns:mc="http://schemas.openxmlformats.org/markup-compatibility/2006" xmlns:p14="http://schemas.microsoft.com/office/powerpoint/2010/main">
-    <mc:Choice Requires="p14">
-      <p:transition spd="med" p14:dur="700">
-        <p:fade/>
-      </p:transition>
-    </mc:Choice>
-    <mc:Fallback xmlns="">
-      <p:transition spd="med">
-        <p:fade/>
-      </p:transition>
-    </mc:Fallback>
-  </mc:AlternateContent>
-</p:sld>
-</file>
-
-<file path=ppt/slides/slide24.xml><?xml version="1.0" encoding="utf-8"?>
-<p:sld xmlns:a="http://schemas.openxmlformats.org/drawingml/2006/main" xmlns:r="http://schemas.openxmlformats.org/officeDocument/2006/relationships" xmlns:p="http://schemas.openxmlformats.org/presentationml/2006/main">
-  <p:cSld>
-    <p:spTree>
-      <p:nvGrpSpPr>
-        <p:cNvPr id="1" name=""/>
-        <p:cNvGrpSpPr/>
-        <p:nvPr/>
-      </p:nvGrpSpPr>
-      <p:grpSpPr>
-        <a:xfrm>
-          <a:off x="0" y="0"/>
-          <a:ext cx="0" cy="0"/>
-          <a:chOff x="0" y="0"/>
-          <a:chExt cx="0" cy="0"/>
-        </a:xfrm>
-      </p:grpSpPr>
-      <p:sp>
-        <p:nvSpPr>
-          <p:cNvPr id="2" name="Title 1"/>
-          <p:cNvSpPr>
-            <a:spLocks noGrp="1"/>
-          </p:cNvSpPr>
-          <p:nvPr>
-            <p:ph type="title"/>
-          </p:nvPr>
-        </p:nvSpPr>
-        <p:spPr/>
-        <p:txBody>
-          <a:bodyPr/>
-          <a:lstStyle/>
-          <a:p>
-            <a:r>
-              <a:rPr lang="en-US"/>
-              <a:t>Execute POC Implementation Checklist</a:t>
-            </a:r>
-            <a:endParaRPr lang="en-US" dirty="0"/>
-          </a:p>
-        </p:txBody>
-      </p:sp>
-      <p:sp>
-        <p:nvSpPr>
-          <p:cNvPr id="11" name="TextBox 10"/>
-          <p:cNvSpPr txBox="1"/>
-          <p:nvPr/>
-        </p:nvSpPr>
-        <p:spPr>
-          <a:xfrm>
-            <a:off x="2198194" y="1817396"/>
-            <a:ext cx="8129681" cy="794064"/>
-          </a:xfrm>
-          <a:prstGeom prst="rect">
-            <a:avLst/>
-          </a:prstGeom>
-          <a:noFill/>
-        </p:spPr>
-        <p:txBody>
-          <a:bodyPr wrap="square" lIns="182880" tIns="146304" rIns="182880" bIns="146304" rtlCol="0">
-            <a:spAutoFit/>
-          </a:bodyPr>
-          <a:lstStyle/>
-          <a:p>
-            <a:pPr>
-              <a:lnSpc>
-                <a:spcPct val="90000"/>
-              </a:lnSpc>
-              <a:spcAft>
-                <a:spcPts val="600"/>
-              </a:spcAft>
-            </a:pPr>
-            <a:r>
-              <a:rPr lang="en-US" dirty="0">
-                <a:latin typeface="+mj-lt"/>
-              </a:rPr>
-              <a:t>Work with your group to draw out the POC architecture, components, technical resources, and success criteria. Be sure to do the following:</a:t>
-            </a:r>
-          </a:p>
-        </p:txBody>
-      </p:sp>
-      <p:sp>
-        <p:nvSpPr>
-          <p:cNvPr id="6" name="Rectangle 5"/>
-          <p:cNvSpPr/>
-          <p:nvPr/>
-        </p:nvSpPr>
-        <p:spPr>
-          <a:xfrm>
-            <a:off x="2661450" y="3030026"/>
-            <a:ext cx="8494230" cy="2720745"/>
-          </a:xfrm>
-          <a:prstGeom prst="rect">
-            <a:avLst/>
-          </a:prstGeom>
-        </p:spPr>
-        <p:txBody>
-          <a:bodyPr wrap="square">
-            <a:spAutoFit/>
-          </a:bodyPr>
-          <a:lstStyle/>
-          <a:p>
-            <a:pPr marL="285750" indent="-285750">
-              <a:lnSpc>
-                <a:spcPct val="90000"/>
-              </a:lnSpc>
-              <a:spcAft>
-                <a:spcPts val="600"/>
-              </a:spcAft>
-              <a:buFont typeface="Wingdings" charset="2"/>
-              <a:buChar char="q"/>
-            </a:pPr>
-            <a:r>
-              <a:rPr lang="en-US" dirty="0"/>
-              <a:t>List all required technical resources</a:t>
-            </a:r>
-          </a:p>
-          <a:p>
-            <a:pPr marL="285750" indent="-285750">
-              <a:lnSpc>
-                <a:spcPct val="90000"/>
-              </a:lnSpc>
-              <a:spcAft>
-                <a:spcPts val="600"/>
-              </a:spcAft>
-              <a:buFont typeface="Wingdings" charset="2"/>
-              <a:buChar char="q"/>
-            </a:pPr>
-            <a:r>
-              <a:rPr lang="en-US" dirty="0"/>
-              <a:t>Identify existing templates that can be used to jump-start POC development, such as ARM templates and Visual Studio project templates</a:t>
-            </a:r>
-          </a:p>
-          <a:p>
-            <a:pPr marL="285750" indent="-285750">
-              <a:lnSpc>
-                <a:spcPct val="90000"/>
-              </a:lnSpc>
-              <a:spcAft>
-                <a:spcPts val="600"/>
-              </a:spcAft>
-              <a:buFont typeface="Wingdings" charset="2"/>
-              <a:buChar char="q"/>
-            </a:pPr>
-            <a:r>
-              <a:rPr lang="en-US" dirty="0"/>
-              <a:t>List PaaS services that will be used</a:t>
-            </a:r>
-          </a:p>
-          <a:p>
-            <a:pPr marL="285750" indent="-285750">
-              <a:lnSpc>
-                <a:spcPct val="90000"/>
-              </a:lnSpc>
-              <a:spcAft>
-                <a:spcPts val="600"/>
-              </a:spcAft>
-              <a:buFont typeface="Wingdings" charset="2"/>
-              <a:buChar char="q"/>
-            </a:pPr>
-            <a:r>
-              <a:rPr lang="en-US" dirty="0"/>
-              <a:t>Figure out which functionality should be implemented, and which should be stubbed out for reference only</a:t>
-            </a:r>
-          </a:p>
-          <a:p>
-            <a:pPr marL="285750" indent="-285750">
-              <a:lnSpc>
-                <a:spcPct val="90000"/>
-              </a:lnSpc>
-              <a:spcAft>
-                <a:spcPts val="600"/>
-              </a:spcAft>
-              <a:buFont typeface="Wingdings" charset="2"/>
-              <a:buChar char="q"/>
-            </a:pPr>
-            <a:r>
-              <a:rPr lang="en-US" dirty="0"/>
-              <a:t>Create a testing plan, both automated and acceptance tests</a:t>
-            </a:r>
-          </a:p>
-          <a:p>
-            <a:pPr marL="285750" indent="-285750">
-              <a:lnSpc>
-                <a:spcPct val="90000"/>
-              </a:lnSpc>
-              <a:spcAft>
-                <a:spcPts val="600"/>
-              </a:spcAft>
-              <a:buFont typeface="Wingdings" charset="2"/>
-              <a:buChar char="q"/>
-            </a:pPr>
-            <a:r>
-              <a:rPr lang="en-US" dirty="0"/>
-              <a:t>Discuss how you will involve the customer and/or users in your testing process, to help identify bugs, surface usability issues, and validate business requirements</a:t>
-            </a:r>
-          </a:p>
-        </p:txBody>
-      </p:sp>
-      <p:pic>
-        <p:nvPicPr>
-          <p:cNvPr id="3" name="Picture 2"/>
-          <p:cNvPicPr>
-            <a:picLocks noChangeAspect="1"/>
-          </p:cNvPicPr>
-          <p:nvPr/>
-        </p:nvPicPr>
-        <p:blipFill>
-          <a:blip r:embed="rId3">
-            <a:biLevel thresh="25000"/>
-          </a:blip>
-          <a:stretch>
-            <a:fillRect/>
-          </a:stretch>
-        </p:blipFill>
-        <p:spPr>
-          <a:xfrm>
-            <a:off x="370844" y="3474859"/>
-            <a:ext cx="1787482" cy="1787482"/>
-          </a:xfrm>
-          <a:prstGeom prst="rect">
-            <a:avLst/>
-          </a:prstGeom>
-        </p:spPr>
-      </p:pic>
-    </p:spTree>
-    <p:extLst>
-      <p:ext uri="{BB962C8B-B14F-4D97-AF65-F5344CB8AC3E}">
-        <p14:creationId xmlns:p14="http://schemas.microsoft.com/office/powerpoint/2010/main" val="1179139050"/>
-      </p:ext>
-    </p:extLst>
-  </p:cSld>
-  <p:clrMapOvr>
-    <a:masterClrMapping/>
-  </p:clrMapOvr>
-  <mc:AlternateContent xmlns:mc="http://schemas.openxmlformats.org/markup-compatibility/2006" xmlns:p14="http://schemas.microsoft.com/office/powerpoint/2010/main">
-    <mc:Choice Requires="p14">
-      <p:transition spd="med" p14:dur="700">
-        <p:fade/>
-      </p:transition>
-    </mc:Choice>
-    <mc:Fallback xmlns="">
-      <p:transition spd="med">
-        <p:fade/>
-      </p:transition>
-    </mc:Fallback>
-  </mc:AlternateContent>
-</p:sld>
-</file>
-
-<file path=ppt/slides/slide25.xml><?xml version="1.0" encoding="utf-8"?>
-<p:sld xmlns:a="http://schemas.openxmlformats.org/drawingml/2006/main" xmlns:r="http://schemas.openxmlformats.org/officeDocument/2006/relationships" xmlns:p="http://schemas.openxmlformats.org/presentationml/2006/main">
-  <p:cSld>
-    <p:spTree>
-      <p:nvGrpSpPr>
-        <p:cNvPr id="1" name=""/>
-        <p:cNvGrpSpPr/>
-        <p:nvPr/>
-      </p:nvGrpSpPr>
-      <p:grpSpPr>
-        <a:xfrm>
-          <a:off x="0" y="0"/>
-          <a:ext cx="0" cy="0"/>
-          <a:chOff x="0" y="0"/>
-          <a:chExt cx="0" cy="0"/>
-        </a:xfrm>
-      </p:grpSpPr>
-      <p:sp>
-        <p:nvSpPr>
-          <p:cNvPr id="2" name="Title 1"/>
-          <p:cNvSpPr>
-            <a:spLocks noGrp="1"/>
-          </p:cNvSpPr>
-          <p:nvPr>
-            <p:ph type="title"/>
-          </p:nvPr>
-        </p:nvSpPr>
-        <p:spPr/>
-        <p:txBody>
-          <a:bodyPr/>
-          <a:lstStyle/>
-          <a:p>
-            <a:r>
-              <a:rPr lang="en-US"/>
-              <a:t>POC Conclusion Checklist</a:t>
-            </a:r>
-            <a:endParaRPr lang="en-US" dirty="0"/>
-          </a:p>
-        </p:txBody>
-      </p:sp>
-      <p:sp>
-        <p:nvSpPr>
-          <p:cNvPr id="11" name="TextBox 10"/>
-          <p:cNvSpPr txBox="1"/>
-          <p:nvPr/>
-        </p:nvSpPr>
-        <p:spPr>
-          <a:xfrm>
-            <a:off x="2198194" y="1051422"/>
-            <a:ext cx="8129681" cy="1541961"/>
-          </a:xfrm>
-          <a:prstGeom prst="rect">
-            <a:avLst/>
-          </a:prstGeom>
-          <a:noFill/>
-        </p:spPr>
-        <p:txBody>
-          <a:bodyPr wrap="square" lIns="182880" tIns="146304" rIns="182880" bIns="146304" rtlCol="0">
-            <a:spAutoFit/>
-          </a:bodyPr>
-          <a:lstStyle/>
-          <a:p>
-            <a:pPr>
-              <a:lnSpc>
-                <a:spcPct val="90000"/>
-              </a:lnSpc>
-              <a:spcAft>
-                <a:spcPts val="600"/>
-              </a:spcAft>
-            </a:pPr>
-            <a:r>
-              <a:rPr lang="en-US" dirty="0">
-                <a:latin typeface="+mj-lt"/>
-              </a:rPr>
-              <a:t>After your team has met the success criteria of the POC, it is time to move into the next phase of the project. Make certain you clearly outline what went well with the POC, and what should be addressed when planning the production development process. If the POC failed, address the shortcomings and be prepared to conduct a new ADS to work on a new strategy.</a:t>
-            </a:r>
-          </a:p>
-        </p:txBody>
-      </p:sp>
-      <p:sp>
-        <p:nvSpPr>
-          <p:cNvPr id="6" name="Rectangle 5"/>
-          <p:cNvSpPr/>
-          <p:nvPr/>
-        </p:nvSpPr>
-        <p:spPr>
-          <a:xfrm>
-            <a:off x="2661450" y="2806348"/>
-            <a:ext cx="8494230" cy="2068259"/>
-          </a:xfrm>
-          <a:prstGeom prst="rect">
-            <a:avLst/>
-          </a:prstGeom>
-        </p:spPr>
-        <p:txBody>
-          <a:bodyPr wrap="square">
-            <a:spAutoFit/>
-          </a:bodyPr>
-          <a:lstStyle/>
-          <a:p>
-            <a:pPr marL="285750" indent="-285750">
-              <a:lnSpc>
-                <a:spcPct val="90000"/>
-              </a:lnSpc>
-              <a:spcAft>
-                <a:spcPts val="600"/>
-              </a:spcAft>
-              <a:buFont typeface="Wingdings" charset="2"/>
-              <a:buChar char="q"/>
-            </a:pPr>
-            <a:r>
-              <a:rPr lang="en-US" dirty="0"/>
-              <a:t>Create a report that explains the overall status of the POC and any issues identified during the execution phase</a:t>
-            </a:r>
-          </a:p>
-          <a:p>
-            <a:pPr marL="285750" indent="-285750">
-              <a:lnSpc>
-                <a:spcPct val="90000"/>
-              </a:lnSpc>
-              <a:spcAft>
-                <a:spcPts val="600"/>
-              </a:spcAft>
-              <a:buFont typeface="Wingdings" charset="2"/>
-              <a:buChar char="q"/>
-            </a:pPr>
-            <a:r>
-              <a:rPr lang="en-US" dirty="0"/>
-              <a:t>Explain the value proposition of moving forward with a real implementation</a:t>
-            </a:r>
-          </a:p>
-          <a:p>
-            <a:pPr marL="742950" lvl="1" indent="-285750">
-              <a:lnSpc>
-                <a:spcPct val="90000"/>
-              </a:lnSpc>
-              <a:spcAft>
-                <a:spcPts val="600"/>
-              </a:spcAft>
-              <a:buFont typeface="Wingdings" charset="2"/>
-              <a:buChar char="q"/>
-            </a:pPr>
-            <a:r>
-              <a:rPr lang="en-US" dirty="0"/>
-              <a:t>Stress to stakeholders that a POC should </a:t>
-            </a:r>
-            <a:r>
-              <a:rPr lang="en-US" dirty="0" err="1"/>
-              <a:t>ot</a:t>
-            </a:r>
-            <a:r>
-              <a:rPr lang="en-US" dirty="0"/>
-              <a:t> be used in production</a:t>
-            </a:r>
-          </a:p>
-          <a:p>
-            <a:pPr marL="285750" indent="-285750">
-              <a:lnSpc>
-                <a:spcPct val="90000"/>
-              </a:lnSpc>
-              <a:spcAft>
-                <a:spcPts val="600"/>
-              </a:spcAft>
-              <a:buFont typeface="Wingdings" charset="2"/>
-              <a:buChar char="q"/>
-            </a:pPr>
-            <a:r>
-              <a:rPr lang="en-US" dirty="0"/>
-              <a:t>Upon agreeing to move to the production phase, create a plan to implement learnings from the POC, delivery schedule, and the cost of the production solution</a:t>
-            </a:r>
-          </a:p>
-        </p:txBody>
-      </p:sp>
-      <p:pic>
-        <p:nvPicPr>
-          <p:cNvPr id="3" name="Picture 2"/>
-          <p:cNvPicPr>
-            <a:picLocks noChangeAspect="1"/>
-          </p:cNvPicPr>
-          <p:nvPr/>
-        </p:nvPicPr>
-        <p:blipFill>
-          <a:blip r:embed="rId3"/>
-          <a:stretch>
-            <a:fillRect/>
-          </a:stretch>
-        </p:blipFill>
-        <p:spPr>
-          <a:xfrm>
-            <a:off x="466342" y="2947414"/>
-            <a:ext cx="1786129" cy="1786129"/>
-          </a:xfrm>
-          <a:prstGeom prst="rect">
-            <a:avLst/>
-          </a:prstGeom>
-        </p:spPr>
-      </p:pic>
-    </p:spTree>
-    <p:extLst>
-      <p:ext uri="{BB962C8B-B14F-4D97-AF65-F5344CB8AC3E}">
-        <p14:creationId xmlns:p14="http://schemas.microsoft.com/office/powerpoint/2010/main" val="2361099267"/>
-      </p:ext>
-    </p:extLst>
-  </p:cSld>
-  <p:clrMapOvr>
-    <a:masterClrMapping/>
-  </p:clrMapOvr>
-  <mc:AlternateContent xmlns:mc="http://schemas.openxmlformats.org/markup-compatibility/2006" xmlns:p14="http://schemas.microsoft.com/office/powerpoint/2010/main">
-    <mc:Choice Requires="p14">
-      <p:transition spd="med" p14:dur="700">
-        <p:fade/>
-      </p:transition>
-    </mc:Choice>
-    <mc:Fallback xmlns="">
-      <p:transition spd="med">
-        <p:fade/>
-      </p:transition>
+      <p:transition/>
     </mc:Fallback>
   </mc:AlternateContent>
 </p:sld>
@@ -25565,21 +23475,21 @@
 </file>
 
 <file path=customXml/item2.xml><?xml version="1.0" encoding="utf-8"?>
+<?mso-contentType ?>
+<FormTemplates xmlns="http://schemas.microsoft.com/sharepoint/v3/contenttype/forms">
+  <Display>DocumentLibraryForm</Display>
+  <Edit>DocumentLibraryForm</Edit>
+  <New>DocumentLibraryForm</New>
+</FormTemplates>
+</file>
+
+<file path=customXml/item3.xml><?xml version="1.0" encoding="utf-8"?>
 <p:properties xmlns:p="http://schemas.microsoft.com/office/2006/metadata/properties" xmlns:xsi="http://www.w3.org/2001/XMLSchema-instance" xmlns:pc="http://schemas.microsoft.com/office/infopath/2007/PartnerControls">
   <documentManagement>
     <_ip_UnifiedCompliancePolicyUIAction xmlns="http://schemas.microsoft.com/sharepoint/v3" xsi:nil="true"/>
     <_ip_UnifiedCompliancePolicyProperties xmlns="http://schemas.microsoft.com/sharepoint/v3" xsi:nil="true"/>
   </documentManagement>
 </p:properties>
-</file>
-
-<file path=customXml/item3.xml><?xml version="1.0" encoding="utf-8"?>
-<?mso-contentType ?>
-<FormTemplates xmlns="http://schemas.microsoft.com/sharepoint/v3/contenttype/forms">
-  <Display>DocumentLibraryForm</Display>
-  <Edit>DocumentLibraryForm</Edit>
-  <New>DocumentLibraryForm</New>
-</FormTemplates>
 </file>
 
 <file path=customXml/itemProps1.xml><?xml version="1.0" encoding="utf-8"?>
@@ -25603,6 +23513,14 @@
 </file>
 
 <file path=customXml/itemProps2.xml><?xml version="1.0" encoding="utf-8"?>
+<ds:datastoreItem xmlns:ds="http://schemas.openxmlformats.org/officeDocument/2006/customXml" ds:itemID="{F18501AF-04CF-4482-BAE1-607B49DDC378}">
+  <ds:schemaRefs>
+    <ds:schemaRef ds:uri="http://schemas.microsoft.com/sharepoint/v3/contenttype/forms"/>
+  </ds:schemaRefs>
+</ds:datastoreItem>
+</file>
+
+<file path=customXml/itemProps3.xml><?xml version="1.0" encoding="utf-8"?>
 <ds:datastoreItem xmlns:ds="http://schemas.openxmlformats.org/officeDocument/2006/customXml" ds:itemID="{BAF7D529-36AB-45DA-B239-2F912F2D1610}">
   <ds:schemaRefs>
     <ds:schemaRef ds:uri="http://purl.org/dc/elements/1.1/"/>
@@ -25618,12 +23536,4 @@
     <ds:schemaRef ds:uri="http://www.w3.org/XML/1998/namespace"/>
   </ds:schemaRefs>
 </ds:datastoreItem>
-</file>
-
-<file path=customXml/itemProps3.xml><?xml version="1.0" encoding="utf-8"?>
-<ds:datastoreItem xmlns:ds="http://schemas.openxmlformats.org/officeDocument/2006/customXml" ds:itemID="{F18501AF-04CF-4482-BAE1-607B49DDC378}">
-  <ds:schemaRefs>
-    <ds:schemaRef ds:uri="http://schemas.microsoft.com/sharepoint/v3/contenttype/forms"/>
-  </ds:schemaRefs>
-</ds:datastoreItem>
 </file>
</xml_diff>